<commit_message>
more presentation and edited the inputerino
</commit_message>
<xml_diff>
--- a/Presentation/MatrixLite.pptx
+++ b/Presentation/MatrixLite.pptx
@@ -15,6 +15,9 @@
     <p:sldId id="262" r:id="rId9"/>
     <p:sldId id="264" r:id="rId10"/>
     <p:sldId id="265" r:id="rId11"/>
+    <p:sldId id="268" r:id="rId12"/>
+    <p:sldId id="266" r:id="rId13"/>
+    <p:sldId id="267" r:id="rId14"/>
   </p:sldIdLst>
   <p:sldSz cx="9144000" cy="6858000" type="screen4x3"/>
   <p:notesSz cx="6858000" cy="9144000"/>
@@ -3509,10 +3512,776 @@
           <a:chExt cx="0" cy="0"/>
         </a:xfrm>
       </p:grpSpPr>
+      <p:pic>
+        <p:nvPicPr>
+          <p:cNvPr id="1026" name="Picture 2" descr="C:\Users\karim.luy\He-ARC\INF2dlm-b\Projet P2 - Java\TurboSpin\Presentation\qrotated.png"/>
+          <p:cNvPicPr>
+            <a:picLocks noChangeAspect="1" noChangeArrowheads="1"/>
+          </p:cNvPicPr>
+          <p:nvPr/>
+        </p:nvPicPr>
+        <p:blipFill>
+          <a:blip r:embed="rId2">
+            <a:extLst>
+              <a:ext uri="{28A0092B-C50C-407E-A947-70E740481C1C}">
+                <a14:useLocalDpi xmlns:a14="http://schemas.microsoft.com/office/drawing/2010/main" val="0"/>
+              </a:ext>
+            </a:extLst>
+          </a:blip>
+          <a:srcRect/>
+          <a:stretch>
+            <a:fillRect/>
+          </a:stretch>
+        </p:blipFill>
+        <p:spPr bwMode="auto">
+          <a:xfrm>
+            <a:off x="1043608" y="383704"/>
+            <a:ext cx="7631113" cy="6007100"/>
+          </a:xfrm>
+          <a:prstGeom prst="rect">
+            <a:avLst/>
+          </a:prstGeom>
+          <a:noFill/>
+          <a:extLst>
+            <a:ext uri="{909E8E84-426E-40DD-AFC4-6F175D3DCCD1}">
+              <a14:hiddenFill xmlns:a14="http://schemas.microsoft.com/office/drawing/2010/main">
+                <a:solidFill>
+                  <a:srgbClr val="FFFFFF"/>
+                </a:solidFill>
+              </a14:hiddenFill>
+            </a:ext>
+          </a:extLst>
+        </p:spPr>
+      </p:pic>
     </p:spTree>
     <p:extLst>
       <p:ext uri="{BB962C8B-B14F-4D97-AF65-F5344CB8AC3E}">
         <p14:creationId xmlns:p14="http://schemas.microsoft.com/office/powerpoint/2010/main" val="2688325040"/>
+      </p:ext>
+    </p:extLst>
+  </p:cSld>
+  <p:clrMapOvr>
+    <a:masterClrMapping/>
+  </p:clrMapOvr>
+  <p:timing>
+    <p:tnLst>
+      <p:par>
+        <p:cTn id="1" dur="indefinite" restart="never" nodeType="tmRoot"/>
+      </p:par>
+    </p:tnLst>
+  </p:timing>
+</p:sld>
+</file>
+
+<file path=ppt/slides/slide11.xml><?xml version="1.0" encoding="utf-8"?>
+<p:sld xmlns:a="http://schemas.openxmlformats.org/drawingml/2006/main" xmlns:r="http://schemas.openxmlformats.org/officeDocument/2006/relationships" xmlns:p="http://schemas.openxmlformats.org/presentationml/2006/main">
+  <p:cSld>
+    <p:spTree>
+      <p:nvGrpSpPr>
+        <p:cNvPr id="1" name=""/>
+        <p:cNvGrpSpPr/>
+        <p:nvPr/>
+      </p:nvGrpSpPr>
+      <p:grpSpPr>
+        <a:xfrm>
+          <a:off x="0" y="0"/>
+          <a:ext cx="0" cy="0"/>
+          <a:chOff x="0" y="0"/>
+          <a:chExt cx="0" cy="0"/>
+        </a:xfrm>
+      </p:grpSpPr>
+      <p:sp>
+        <p:nvSpPr>
+          <p:cNvPr id="2" name="Titre 1"/>
+          <p:cNvSpPr>
+            <a:spLocks noGrp="1"/>
+          </p:cNvSpPr>
+          <p:nvPr>
+            <p:ph type="title"/>
+          </p:nvPr>
+        </p:nvSpPr>
+        <p:spPr/>
+        <p:txBody>
+          <a:bodyPr/>
+          <a:lstStyle/>
+          <a:p>
+            <a:r>
+              <a:rPr lang="en-GB" dirty="0" smtClean="0">
+                <a:latin typeface="Berlin Sans FB" panose="020E0602020502020306" pitchFamily="34" charset="0"/>
+              </a:rPr>
+              <a:t>Le </a:t>
+            </a:r>
+            <a:r>
+              <a:rPr lang="en-GB" dirty="0" err="1" smtClean="0">
+                <a:latin typeface="Berlin Sans FB" panose="020E0602020502020306" pitchFamily="34" charset="0"/>
+              </a:rPr>
+              <a:t>vraie</a:t>
+            </a:r>
+            <a:r>
+              <a:rPr lang="en-GB" dirty="0" smtClean="0">
+                <a:latin typeface="Berlin Sans FB" panose="020E0602020502020306" pitchFamily="34" charset="0"/>
+              </a:rPr>
+              <a:t> </a:t>
+            </a:r>
+            <a:r>
+              <a:rPr lang="en-GB" dirty="0" err="1" smtClean="0">
+                <a:latin typeface="Berlin Sans FB" panose="020E0602020502020306" pitchFamily="34" charset="0"/>
+              </a:rPr>
+              <a:t>probl</a:t>
+            </a:r>
+            <a:r>
+              <a:rPr lang="fr-CH" dirty="0" smtClean="0">
+                <a:latin typeface="Berlin Sans FB" panose="020E0602020502020306" pitchFamily="34" charset="0"/>
+              </a:rPr>
+              <a:t>è</a:t>
+            </a:r>
+            <a:r>
+              <a:rPr lang="en-GB" dirty="0" smtClean="0">
+                <a:latin typeface="Berlin Sans FB" panose="020E0602020502020306" pitchFamily="34" charset="0"/>
+              </a:rPr>
+              <a:t>me</a:t>
+            </a:r>
+            <a:endParaRPr lang="fr-CH" dirty="0">
+              <a:latin typeface="Berlin Sans FB" panose="020E0602020502020306" pitchFamily="34" charset="0"/>
+            </a:endParaRPr>
+          </a:p>
+        </p:txBody>
+      </p:sp>
+      <p:sp>
+        <p:nvSpPr>
+          <p:cNvPr id="3" name="Espace réservé du contenu 2"/>
+          <p:cNvSpPr>
+            <a:spLocks noGrp="1"/>
+          </p:cNvSpPr>
+          <p:nvPr>
+            <p:ph idx="1"/>
+          </p:nvPr>
+        </p:nvSpPr>
+        <p:spPr/>
+        <p:txBody>
+          <a:bodyPr/>
+          <a:lstStyle/>
+          <a:p>
+            <a:endParaRPr lang="en-GB" dirty="0" smtClean="0"/>
+          </a:p>
+          <a:p>
+            <a:endParaRPr lang="en-GB" dirty="0"/>
+          </a:p>
+          <a:p>
+            <a:r>
+              <a:rPr lang="en-GB" dirty="0" smtClean="0"/>
+              <a:t>Les maths </a:t>
+            </a:r>
+            <a:r>
+              <a:rPr lang="en-GB" dirty="0" err="1" smtClean="0"/>
+              <a:t>sont</a:t>
+            </a:r>
+            <a:r>
+              <a:rPr lang="en-GB" dirty="0" smtClean="0"/>
+              <a:t> </a:t>
+            </a:r>
+            <a:r>
+              <a:rPr lang="en-GB" dirty="0" err="1" smtClean="0"/>
+              <a:t>bien</a:t>
+            </a:r>
+            <a:r>
+              <a:rPr lang="en-GB" dirty="0" smtClean="0"/>
+              <a:t> </a:t>
+            </a:r>
+            <a:r>
+              <a:rPr lang="en-GB" dirty="0" err="1" smtClean="0"/>
+              <a:t>jolie</a:t>
+            </a:r>
+            <a:r>
+              <a:rPr lang="en-GB" dirty="0" smtClean="0"/>
+              <a:t> </a:t>
+            </a:r>
+            <a:r>
+              <a:rPr lang="en-GB" dirty="0" err="1" smtClean="0"/>
+              <a:t>sur</a:t>
+            </a:r>
+            <a:r>
+              <a:rPr lang="en-GB" dirty="0" smtClean="0"/>
+              <a:t> </a:t>
+            </a:r>
+            <a:r>
+              <a:rPr lang="en-GB" dirty="0" err="1" smtClean="0"/>
+              <a:t>papier</a:t>
+            </a:r>
+            <a:endParaRPr lang="en-GB" dirty="0" smtClean="0"/>
+          </a:p>
+          <a:p>
+            <a:r>
+              <a:rPr lang="en-GB" dirty="0" err="1" smtClean="0"/>
+              <a:t>Mais</a:t>
+            </a:r>
+            <a:r>
+              <a:rPr lang="en-GB" dirty="0" smtClean="0"/>
+              <a:t> </a:t>
+            </a:r>
+            <a:r>
+              <a:rPr lang="en-GB" dirty="0" err="1" smtClean="0"/>
+              <a:t>qu’es-ce</a:t>
+            </a:r>
+            <a:r>
+              <a:rPr lang="en-GB" dirty="0" smtClean="0"/>
+              <a:t> </a:t>
+            </a:r>
+            <a:r>
+              <a:rPr lang="en-GB" dirty="0" err="1" smtClean="0"/>
+              <a:t>que</a:t>
+            </a:r>
+            <a:r>
+              <a:rPr lang="en-GB" dirty="0" smtClean="0"/>
+              <a:t> </a:t>
+            </a:r>
+            <a:r>
+              <a:rPr lang="en-GB" dirty="0" err="1" smtClean="0"/>
+              <a:t>ces</a:t>
+            </a:r>
+            <a:r>
+              <a:rPr lang="en-GB" dirty="0" smtClean="0"/>
+              <a:t> </a:t>
+            </a:r>
+            <a:r>
+              <a:rPr lang="en-GB" dirty="0" err="1" smtClean="0"/>
+              <a:t>nombres</a:t>
+            </a:r>
+            <a:r>
+              <a:rPr lang="en-GB" dirty="0" smtClean="0"/>
+              <a:t> </a:t>
+            </a:r>
+            <a:r>
+              <a:rPr lang="en-GB" dirty="0" err="1" smtClean="0"/>
+              <a:t>representent</a:t>
+            </a:r>
+            <a:r>
+              <a:rPr lang="en-GB" dirty="0" smtClean="0"/>
+              <a:t>?</a:t>
+            </a:r>
+          </a:p>
+          <a:p>
+            <a:r>
+              <a:rPr lang="en-GB" dirty="0" err="1" smtClean="0"/>
+              <a:t>Arrivez-vous</a:t>
+            </a:r>
+            <a:r>
+              <a:rPr lang="en-GB" dirty="0" smtClean="0"/>
+              <a:t> a </a:t>
+            </a:r>
+            <a:r>
+              <a:rPr lang="en-GB" dirty="0" err="1" smtClean="0"/>
+              <a:t>vous</a:t>
+            </a:r>
+            <a:r>
+              <a:rPr lang="en-GB" dirty="0" smtClean="0"/>
+              <a:t> </a:t>
+            </a:r>
+            <a:r>
+              <a:rPr lang="en-GB" dirty="0" err="1" smtClean="0"/>
+              <a:t>representer</a:t>
+            </a:r>
+            <a:r>
+              <a:rPr lang="en-GB" dirty="0" smtClean="0"/>
+              <a:t> </a:t>
+            </a:r>
+            <a:r>
+              <a:rPr lang="en-GB" dirty="0" err="1" smtClean="0"/>
+              <a:t>une</a:t>
+            </a:r>
+            <a:r>
+              <a:rPr lang="en-GB" dirty="0" smtClean="0"/>
+              <a:t> rotation </a:t>
+            </a:r>
+            <a:r>
+              <a:rPr lang="en-GB" dirty="0" err="1" smtClean="0"/>
+              <a:t>en</a:t>
+            </a:r>
+            <a:r>
+              <a:rPr lang="en-GB" dirty="0" smtClean="0"/>
+              <a:t> 3D </a:t>
+            </a:r>
+            <a:r>
+              <a:rPr lang="en-GB" dirty="0" err="1" smtClean="0"/>
+              <a:t>en</a:t>
+            </a:r>
+            <a:r>
+              <a:rPr lang="en-GB" dirty="0" smtClean="0"/>
+              <a:t> </a:t>
+            </a:r>
+            <a:r>
+              <a:rPr lang="en-GB" dirty="0" err="1" smtClean="0"/>
+              <a:t>partant</a:t>
+            </a:r>
+            <a:r>
+              <a:rPr lang="en-GB" dirty="0" smtClean="0"/>
+              <a:t> de 3 matrices </a:t>
+            </a:r>
+            <a:r>
+              <a:rPr lang="en-GB" dirty="0" err="1" smtClean="0"/>
+              <a:t>ou</a:t>
+            </a:r>
+            <a:r>
+              <a:rPr lang="en-GB" dirty="0" smtClean="0"/>
+              <a:t> d’un </a:t>
+            </a:r>
+            <a:r>
+              <a:rPr lang="en-GB" dirty="0" err="1" smtClean="0"/>
+              <a:t>nombre</a:t>
+            </a:r>
+            <a:r>
+              <a:rPr lang="en-GB" dirty="0" smtClean="0"/>
+              <a:t> </a:t>
+            </a:r>
+            <a:r>
+              <a:rPr lang="en-GB" dirty="0" err="1" smtClean="0"/>
+              <a:t>dit</a:t>
+            </a:r>
+            <a:r>
+              <a:rPr lang="en-GB" dirty="0" smtClean="0"/>
+              <a:t> hyper </a:t>
+            </a:r>
+            <a:r>
+              <a:rPr lang="en-GB" dirty="0" err="1" smtClean="0"/>
+              <a:t>complexe</a:t>
+            </a:r>
+            <a:r>
+              <a:rPr lang="en-GB" dirty="0" smtClean="0"/>
+              <a:t>?</a:t>
+            </a:r>
+          </a:p>
+          <a:p>
+            <a:endParaRPr lang="fr-CH" dirty="0"/>
+          </a:p>
+        </p:txBody>
+      </p:sp>
+    </p:spTree>
+    <p:extLst>
+      <p:ext uri="{BB962C8B-B14F-4D97-AF65-F5344CB8AC3E}">
+        <p14:creationId xmlns:p14="http://schemas.microsoft.com/office/powerpoint/2010/main" val="1152032074"/>
+      </p:ext>
+    </p:extLst>
+  </p:cSld>
+  <p:clrMapOvr>
+    <a:masterClrMapping/>
+  </p:clrMapOvr>
+  <p:timing>
+    <p:tnLst>
+      <p:par>
+        <p:cTn id="1" dur="indefinite" restart="never" nodeType="tmRoot"/>
+      </p:par>
+    </p:tnLst>
+  </p:timing>
+</p:sld>
+</file>
+
+<file path=ppt/slides/slide12.xml><?xml version="1.0" encoding="utf-8"?>
+<p:sld xmlns:a="http://schemas.openxmlformats.org/drawingml/2006/main" xmlns:r="http://schemas.openxmlformats.org/officeDocument/2006/relationships" xmlns:p="http://schemas.openxmlformats.org/presentationml/2006/main">
+  <p:cSld>
+    <p:spTree>
+      <p:nvGrpSpPr>
+        <p:cNvPr id="1" name=""/>
+        <p:cNvGrpSpPr/>
+        <p:nvPr/>
+      </p:nvGrpSpPr>
+      <p:grpSpPr>
+        <a:xfrm>
+          <a:off x="0" y="0"/>
+          <a:ext cx="0" cy="0"/>
+          <a:chOff x="0" y="0"/>
+          <a:chExt cx="0" cy="0"/>
+        </a:xfrm>
+      </p:grpSpPr>
+      <p:sp>
+        <p:nvSpPr>
+          <p:cNvPr id="2" name="Titre 1"/>
+          <p:cNvSpPr>
+            <a:spLocks noGrp="1"/>
+          </p:cNvSpPr>
+          <p:nvPr>
+            <p:ph type="title"/>
+          </p:nvPr>
+        </p:nvSpPr>
+        <p:spPr>
+          <a:xfrm>
+            <a:off x="467544" y="2132856"/>
+            <a:ext cx="8229600" cy="1600200"/>
+          </a:xfrm>
+        </p:spPr>
+        <p:txBody>
+          <a:bodyPr/>
+          <a:lstStyle/>
+          <a:p>
+            <a:r>
+              <a:rPr lang="en-GB" dirty="0" smtClean="0">
+                <a:latin typeface="Berlin Sans FB" panose="020E0602020502020306" pitchFamily="34" charset="0"/>
+              </a:rPr>
+              <a:t>Notre solution</a:t>
+            </a:r>
+            <a:endParaRPr lang="fr-CH" dirty="0">
+              <a:latin typeface="Berlin Sans FB" panose="020E0602020502020306" pitchFamily="34" charset="0"/>
+            </a:endParaRPr>
+          </a:p>
+        </p:txBody>
+      </p:sp>
+    </p:spTree>
+    <p:extLst>
+      <p:ext uri="{BB962C8B-B14F-4D97-AF65-F5344CB8AC3E}">
+        <p14:creationId xmlns:p14="http://schemas.microsoft.com/office/powerpoint/2010/main" val="1301567052"/>
+      </p:ext>
+    </p:extLst>
+  </p:cSld>
+  <p:clrMapOvr>
+    <a:masterClrMapping/>
+  </p:clrMapOvr>
+  <p:timing>
+    <p:tnLst>
+      <p:par>
+        <p:cTn id="1" dur="indefinite" restart="never" nodeType="tmRoot"/>
+      </p:par>
+    </p:tnLst>
+  </p:timing>
+</p:sld>
+</file>
+
+<file path=ppt/slides/slide13.xml><?xml version="1.0" encoding="utf-8"?>
+<p:sld xmlns:a="http://schemas.openxmlformats.org/drawingml/2006/main" xmlns:r="http://schemas.openxmlformats.org/officeDocument/2006/relationships" xmlns:p="http://schemas.openxmlformats.org/presentationml/2006/main">
+  <p:cSld>
+    <p:spTree>
+      <p:nvGrpSpPr>
+        <p:cNvPr id="1" name=""/>
+        <p:cNvGrpSpPr/>
+        <p:nvPr/>
+      </p:nvGrpSpPr>
+      <p:grpSpPr>
+        <a:xfrm>
+          <a:off x="0" y="0"/>
+          <a:ext cx="0" cy="0"/>
+          <a:chOff x="0" y="0"/>
+          <a:chExt cx="0" cy="0"/>
+        </a:xfrm>
+      </p:grpSpPr>
+      <p:sp>
+        <p:nvSpPr>
+          <p:cNvPr id="2" name="Titre 1"/>
+          <p:cNvSpPr>
+            <a:spLocks noGrp="1"/>
+          </p:cNvSpPr>
+          <p:nvPr>
+            <p:ph type="title"/>
+          </p:nvPr>
+        </p:nvSpPr>
+        <p:spPr/>
+        <p:txBody>
+          <a:bodyPr/>
+          <a:lstStyle/>
+          <a:p>
+            <a:r>
+              <a:rPr lang="en-GB" dirty="0" smtClean="0">
+                <a:latin typeface="Berlin Sans FB" panose="020E0602020502020306" pitchFamily="34" charset="0"/>
+              </a:rPr>
+              <a:t>Sources</a:t>
+            </a:r>
+            <a:endParaRPr lang="fr-CH" dirty="0">
+              <a:latin typeface="Berlin Sans FB" panose="020E0602020502020306" pitchFamily="34" charset="0"/>
+            </a:endParaRPr>
+          </a:p>
+        </p:txBody>
+      </p:sp>
+      <p:sp>
+        <p:nvSpPr>
+          <p:cNvPr id="3" name="Espace réservé du contenu 2"/>
+          <p:cNvSpPr>
+            <a:spLocks noGrp="1"/>
+          </p:cNvSpPr>
+          <p:nvPr>
+            <p:ph idx="1"/>
+          </p:nvPr>
+        </p:nvSpPr>
+        <p:spPr/>
+        <p:txBody>
+          <a:bodyPr>
+            <a:normAutofit fontScale="85000" lnSpcReduction="10000"/>
+          </a:bodyPr>
+          <a:lstStyle/>
+          <a:p>
+            <a:r>
+              <a:rPr lang="en-US" i="1" dirty="0"/>
+              <a:t>Arrow Rotation</a:t>
+            </a:r>
+            <a:r>
+              <a:rPr lang="en-US" dirty="0"/>
+              <a:t>. Digital image. </a:t>
+            </a:r>
+            <a:r>
+              <a:rPr lang="en-US" dirty="0" err="1"/>
+              <a:t>N.p</a:t>
+            </a:r>
+            <a:r>
+              <a:rPr lang="en-US" dirty="0"/>
+              <a:t>., </a:t>
+            </a:r>
+            <a:r>
+              <a:rPr lang="en-US" dirty="0" err="1"/>
+              <a:t>n.d.</a:t>
+            </a:r>
+            <a:r>
+              <a:rPr lang="en-US" dirty="0"/>
+              <a:t> Web. 05 June 2015. </a:t>
+            </a:r>
+            <a:r>
+              <a:rPr lang="en-US" dirty="0" smtClean="0">
+                <a:hlinkClick r:id="rId2"/>
+              </a:rPr>
+              <a:t>https</a:t>
+            </a:r>
+            <a:r>
+              <a:rPr lang="en-US" dirty="0">
+                <a:hlinkClick r:id="rId2"/>
+              </a:rPr>
+              <a:t>://</a:t>
+            </a:r>
+            <a:r>
+              <a:rPr lang="en-US" dirty="0" smtClean="0">
+                <a:hlinkClick r:id="rId2"/>
+              </a:rPr>
+              <a:t>www.iconfinder.com/icons/393260/arrow_arrows_rotate_icon#size=128</a:t>
+            </a:r>
+            <a:endParaRPr lang="en-US" dirty="0" smtClean="0"/>
+          </a:p>
+          <a:p>
+            <a:r>
+              <a:rPr lang="en-US" dirty="0"/>
+              <a:t>"Complex Number." </a:t>
+            </a:r>
+            <a:r>
+              <a:rPr lang="en-US" i="1" dirty="0"/>
+              <a:t>Wikipedia</a:t>
+            </a:r>
+            <a:r>
+              <a:rPr lang="en-US" dirty="0"/>
+              <a:t>. Wikimedia Foundation, </a:t>
+            </a:r>
+            <a:r>
+              <a:rPr lang="en-US" dirty="0" err="1"/>
+              <a:t>n.d.</a:t>
+            </a:r>
+            <a:r>
+              <a:rPr lang="en-US" dirty="0"/>
+              <a:t> Web. 05 June 2015. </a:t>
+            </a:r>
+            <a:r>
+              <a:rPr lang="en-US" dirty="0" smtClean="0">
+                <a:hlinkClick r:id="rId3"/>
+              </a:rPr>
+              <a:t>http</a:t>
+            </a:r>
+            <a:r>
+              <a:rPr lang="en-US" dirty="0">
+                <a:hlinkClick r:id="rId3"/>
+              </a:rPr>
+              <a:t>://</a:t>
+            </a:r>
+            <a:r>
+              <a:rPr lang="en-US" dirty="0" smtClean="0">
+                <a:hlinkClick r:id="rId3"/>
+              </a:rPr>
+              <a:t>en.wikipedia.org/wiki/Complex_number</a:t>
+            </a:r>
+            <a:endParaRPr lang="en-US" dirty="0" smtClean="0"/>
+          </a:p>
+          <a:p>
+            <a:r>
+              <a:rPr lang="fr-CH" i="1" dirty="0" err="1"/>
+              <a:t>Counterclockwise</a:t>
+            </a:r>
+            <a:r>
+              <a:rPr lang="fr-CH" i="1" dirty="0"/>
+              <a:t> Rotation</a:t>
+            </a:r>
+            <a:r>
+              <a:rPr lang="fr-CH" dirty="0"/>
+              <a:t>. Digital image. </a:t>
+            </a:r>
+            <a:r>
+              <a:rPr lang="fr-CH" i="1" dirty="0" err="1"/>
+              <a:t>Wikipedia</a:t>
+            </a:r>
+            <a:r>
+              <a:rPr lang="fr-CH" dirty="0"/>
+              <a:t>. </a:t>
+            </a:r>
+            <a:r>
+              <a:rPr lang="fr-CH" dirty="0" err="1"/>
+              <a:t>N.p</a:t>
+            </a:r>
+            <a:r>
+              <a:rPr lang="fr-CH" dirty="0"/>
+              <a:t>., </a:t>
+            </a:r>
+            <a:r>
+              <a:rPr lang="fr-CH" dirty="0" err="1"/>
+              <a:t>n.d</a:t>
+            </a:r>
+            <a:r>
+              <a:rPr lang="fr-CH" dirty="0"/>
+              <a:t>. Web. 05 </a:t>
+            </a:r>
+            <a:r>
+              <a:rPr lang="fr-CH" dirty="0" err="1"/>
+              <a:t>June</a:t>
+            </a:r>
+            <a:r>
+              <a:rPr lang="fr-CH" dirty="0"/>
+              <a:t> 2015. </a:t>
+            </a:r>
+            <a:r>
+              <a:rPr lang="fr-CH" dirty="0" smtClean="0">
+                <a:hlinkClick r:id="rId4"/>
+              </a:rPr>
+              <a:t>http</a:t>
+            </a:r>
+            <a:r>
+              <a:rPr lang="fr-CH" dirty="0">
+                <a:hlinkClick r:id="rId4"/>
+              </a:rPr>
+              <a:t>://</a:t>
+            </a:r>
+            <a:r>
+              <a:rPr lang="fr-CH" dirty="0" smtClean="0">
+                <a:hlinkClick r:id="rId4"/>
+              </a:rPr>
+              <a:t>upload.wikimedia.org/wikipedia/commons/d/d5/Counterclockwise_rotation.png</a:t>
+            </a:r>
+            <a:endParaRPr lang="fr-CH" dirty="0" smtClean="0"/>
+          </a:p>
+          <a:p>
+            <a:r>
+              <a:rPr lang="fr-CH" i="1" dirty="0"/>
+              <a:t>Euler Angles</a:t>
+            </a:r>
+            <a:r>
+              <a:rPr lang="fr-CH" dirty="0"/>
+              <a:t>. Digital image. </a:t>
+            </a:r>
+            <a:r>
+              <a:rPr lang="fr-CH" dirty="0" err="1"/>
+              <a:t>N.p</a:t>
+            </a:r>
+            <a:r>
+              <a:rPr lang="fr-CH" dirty="0"/>
+              <a:t>., </a:t>
+            </a:r>
+            <a:r>
+              <a:rPr lang="fr-CH" dirty="0" err="1"/>
+              <a:t>n.d</a:t>
+            </a:r>
+            <a:r>
+              <a:rPr lang="fr-CH" dirty="0"/>
+              <a:t>. Web. 05 </a:t>
+            </a:r>
+            <a:r>
+              <a:rPr lang="fr-CH" dirty="0" err="1"/>
+              <a:t>June</a:t>
+            </a:r>
+            <a:r>
+              <a:rPr lang="fr-CH" dirty="0"/>
+              <a:t> 2015. </a:t>
+            </a:r>
+            <a:r>
+              <a:rPr lang="fr-CH" dirty="0" smtClean="0">
+                <a:hlinkClick r:id="rId5"/>
+              </a:rPr>
+              <a:t>http</a:t>
+            </a:r>
+            <a:r>
+              <a:rPr lang="fr-CH" dirty="0">
+                <a:hlinkClick r:id="rId5"/>
+              </a:rPr>
+              <a:t>://en.wikipedia.org/wiki/Euler_angles#/</a:t>
+            </a:r>
+            <a:r>
+              <a:rPr lang="fr-CH" dirty="0" smtClean="0">
+                <a:hlinkClick r:id="rId5"/>
+              </a:rPr>
+              <a:t>media/File:Eulerangles.svg</a:t>
+            </a:r>
+            <a:endParaRPr lang="fr-CH" dirty="0" smtClean="0"/>
+          </a:p>
+          <a:p>
+            <a:r>
+              <a:rPr lang="fr-CH" dirty="0"/>
+              <a:t>"Rotation Matrix." </a:t>
+            </a:r>
+            <a:r>
+              <a:rPr lang="fr-CH" i="1" dirty="0" err="1"/>
+              <a:t>Wikipedia</a:t>
+            </a:r>
+            <a:r>
+              <a:rPr lang="fr-CH" dirty="0"/>
+              <a:t>. </a:t>
+            </a:r>
+            <a:r>
+              <a:rPr lang="fr-CH" dirty="0" err="1"/>
+              <a:t>Wikimedia</a:t>
+            </a:r>
+            <a:r>
+              <a:rPr lang="fr-CH" dirty="0"/>
+              <a:t> </a:t>
+            </a:r>
+            <a:r>
+              <a:rPr lang="fr-CH" dirty="0" err="1"/>
+              <a:t>Foundation</a:t>
+            </a:r>
+            <a:r>
+              <a:rPr lang="fr-CH" dirty="0"/>
+              <a:t>, </a:t>
+            </a:r>
+            <a:r>
+              <a:rPr lang="fr-CH" dirty="0" err="1"/>
+              <a:t>n.d</a:t>
+            </a:r>
+            <a:r>
+              <a:rPr lang="fr-CH" dirty="0"/>
+              <a:t>. Web. 05 </a:t>
+            </a:r>
+            <a:r>
+              <a:rPr lang="fr-CH" dirty="0" err="1"/>
+              <a:t>June</a:t>
+            </a:r>
+            <a:r>
+              <a:rPr lang="fr-CH" dirty="0"/>
+              <a:t> 2015. </a:t>
+            </a:r>
+            <a:r>
+              <a:rPr lang="fr-CH" dirty="0" smtClean="0">
+                <a:hlinkClick r:id="rId6"/>
+              </a:rPr>
+              <a:t>http</a:t>
+            </a:r>
+            <a:r>
+              <a:rPr lang="fr-CH" dirty="0">
+                <a:hlinkClick r:id="rId6"/>
+              </a:rPr>
+              <a:t>://</a:t>
+            </a:r>
+            <a:r>
+              <a:rPr lang="fr-CH" dirty="0" smtClean="0">
+                <a:hlinkClick r:id="rId6"/>
+              </a:rPr>
+              <a:t>en.wikipedia.org/wiki/Rotation_matrix</a:t>
+            </a:r>
+            <a:endParaRPr lang="fr-CH" dirty="0" smtClean="0"/>
+          </a:p>
+          <a:p>
+            <a:endParaRPr lang="en-US" dirty="0"/>
+          </a:p>
+        </p:txBody>
+      </p:sp>
+    </p:spTree>
+    <p:extLst>
+      <p:ext uri="{BB962C8B-B14F-4D97-AF65-F5344CB8AC3E}">
+        <p14:creationId xmlns:p14="http://schemas.microsoft.com/office/powerpoint/2010/main" val="2407799612"/>
       </p:ext>
     </p:extLst>
   </p:cSld>
@@ -3640,6 +4409,36 @@
           <a:p>
             <a:r>
               <a:rPr lang="en-GB" dirty="0" smtClean="0"/>
+              <a:t>Les matrices </a:t>
+            </a:r>
+            <a:r>
+              <a:rPr lang="en-GB" dirty="0" err="1" smtClean="0"/>
+              <a:t>en</a:t>
+            </a:r>
+            <a:r>
+              <a:rPr lang="en-GB" dirty="0" smtClean="0"/>
+              <a:t> 3D</a:t>
+            </a:r>
+          </a:p>
+          <a:p>
+            <a:r>
+              <a:rPr lang="en-GB" dirty="0" err="1" smtClean="0"/>
+              <a:t>Nombre</a:t>
+            </a:r>
+            <a:r>
+              <a:rPr lang="en-GB" dirty="0" smtClean="0"/>
+              <a:t> complexes</a:t>
+            </a:r>
+          </a:p>
+          <a:p>
+            <a:r>
+              <a:rPr lang="en-GB" dirty="0" smtClean="0"/>
+              <a:t>Quaternions</a:t>
+            </a:r>
+          </a:p>
+          <a:p>
+            <a:r>
+              <a:rPr lang="en-GB" dirty="0" smtClean="0"/>
               <a:t>Le </a:t>
             </a:r>
             <a:r>
@@ -3652,22 +4451,22 @@
             </a:r>
             <a:r>
               <a:rPr lang="en-GB" dirty="0" err="1" smtClean="0"/>
-              <a:t>probl</a:t>
-            </a:r>
-            <a:r>
-              <a:rPr lang="fr-CH" dirty="0" smtClean="0"/>
-              <a:t>è</a:t>
-            </a:r>
-            <a:r>
-              <a:rPr lang="en-GB" dirty="0" smtClean="0"/>
-              <a:t>me</a:t>
-            </a:r>
+              <a:t>probleme</a:t>
+            </a:r>
+            <a:endParaRPr lang="en-GB" dirty="0" smtClean="0"/>
           </a:p>
           <a:p>
             <a:r>
               <a:rPr lang="en-GB" dirty="0" smtClean="0"/>
               <a:t>Notre solution</a:t>
             </a:r>
+          </a:p>
+          <a:p>
+            <a:r>
+              <a:rPr lang="en-GB" dirty="0" smtClean="0"/>
+              <a:t>Sources</a:t>
+            </a:r>
+            <a:endParaRPr lang="en-GB" dirty="0" smtClean="0"/>
           </a:p>
           <a:p>
             <a:endParaRPr lang="en-GB" dirty="0" smtClean="0"/>
@@ -4412,9 +5211,394 @@
   <p:timing>
     <p:tnLst>
       <p:par>
-        <p:cTn id="1" dur="indefinite" restart="never" nodeType="tmRoot"/>
+        <p:cTn id="1" dur="indefinite" restart="never" nodeType="tmRoot">
+          <p:childTnLst>
+            <p:seq concurrent="1" nextAc="seek">
+              <p:cTn id="2" dur="indefinite" nodeType="mainSeq">
+                <p:childTnLst>
+                  <p:par>
+                    <p:cTn id="3" fill="hold">
+                      <p:stCondLst>
+                        <p:cond delay="indefinite"/>
+                      </p:stCondLst>
+                      <p:childTnLst>
+                        <p:par>
+                          <p:cTn id="4" fill="hold">
+                            <p:stCondLst>
+                              <p:cond delay="0"/>
+                            </p:stCondLst>
+                            <p:childTnLst>
+                              <p:par>
+                                <p:cTn id="5" presetID="10" presetClass="entr" presetSubtype="0" fill="hold" nodeType="clickEffect">
+                                  <p:stCondLst>
+                                    <p:cond delay="0"/>
+                                  </p:stCondLst>
+                                  <p:childTnLst>
+                                    <p:set>
+                                      <p:cBhvr>
+                                        <p:cTn id="6" dur="1" fill="hold">
+                                          <p:stCondLst>
+                                            <p:cond delay="0"/>
+                                          </p:stCondLst>
+                                        </p:cTn>
+                                        <p:tgtEl>
+                                          <p:spTgt spid="4">
+                                            <p:txEl>
+                                              <p:pRg st="0" end="0"/>
+                                            </p:txEl>
+                                          </p:spTgt>
+                                        </p:tgtEl>
+                                        <p:attrNameLst>
+                                          <p:attrName>style.visibility</p:attrName>
+                                        </p:attrNameLst>
+                                      </p:cBhvr>
+                                      <p:to>
+                                        <p:strVal val="visible"/>
+                                      </p:to>
+                                    </p:set>
+                                    <p:animEffect transition="in" filter="fade">
+                                      <p:cBhvr>
+                                        <p:cTn id="7" dur="500"/>
+                                        <p:tgtEl>
+                                          <p:spTgt spid="4">
+                                            <p:txEl>
+                                              <p:pRg st="0" end="0"/>
+                                            </p:txEl>
+                                          </p:spTgt>
+                                        </p:tgtEl>
+                                      </p:cBhvr>
+                                    </p:animEffect>
+                                  </p:childTnLst>
+                                </p:cTn>
+                              </p:par>
+                            </p:childTnLst>
+                          </p:cTn>
+                        </p:par>
+                      </p:childTnLst>
+                    </p:cTn>
+                  </p:par>
+                  <p:par>
+                    <p:cTn id="8" fill="hold">
+                      <p:stCondLst>
+                        <p:cond delay="indefinite"/>
+                      </p:stCondLst>
+                      <p:childTnLst>
+                        <p:par>
+                          <p:cTn id="9" fill="hold">
+                            <p:stCondLst>
+                              <p:cond delay="0"/>
+                            </p:stCondLst>
+                            <p:childTnLst>
+                              <p:par>
+                                <p:cTn id="10" presetID="10" presetClass="entr" presetSubtype="0" fill="hold" nodeType="clickEffect">
+                                  <p:stCondLst>
+                                    <p:cond delay="0"/>
+                                  </p:stCondLst>
+                                  <p:childTnLst>
+                                    <p:set>
+                                      <p:cBhvr>
+                                        <p:cTn id="11" dur="1" fill="hold">
+                                          <p:stCondLst>
+                                            <p:cond delay="0"/>
+                                          </p:stCondLst>
+                                        </p:cTn>
+                                        <p:tgtEl>
+                                          <p:spTgt spid="4098"/>
+                                        </p:tgtEl>
+                                        <p:attrNameLst>
+                                          <p:attrName>style.visibility</p:attrName>
+                                        </p:attrNameLst>
+                                      </p:cBhvr>
+                                      <p:to>
+                                        <p:strVal val="visible"/>
+                                      </p:to>
+                                    </p:set>
+                                    <p:animEffect transition="in" filter="fade">
+                                      <p:cBhvr>
+                                        <p:cTn id="12" dur="500"/>
+                                        <p:tgtEl>
+                                          <p:spTgt spid="4098"/>
+                                        </p:tgtEl>
+                                      </p:cBhvr>
+                                    </p:animEffect>
+                                  </p:childTnLst>
+                                </p:cTn>
+                              </p:par>
+                            </p:childTnLst>
+                          </p:cTn>
+                        </p:par>
+                      </p:childTnLst>
+                    </p:cTn>
+                  </p:par>
+                  <p:par>
+                    <p:cTn id="13" fill="hold">
+                      <p:stCondLst>
+                        <p:cond delay="indefinite"/>
+                      </p:stCondLst>
+                      <p:childTnLst>
+                        <p:par>
+                          <p:cTn id="14" fill="hold">
+                            <p:stCondLst>
+                              <p:cond delay="0"/>
+                            </p:stCondLst>
+                            <p:childTnLst>
+                              <p:par>
+                                <p:cTn id="15" presetID="10" presetClass="entr" presetSubtype="0" fill="hold" nodeType="clickEffect">
+                                  <p:stCondLst>
+                                    <p:cond delay="0"/>
+                                  </p:stCondLst>
+                                  <p:childTnLst>
+                                    <p:set>
+                                      <p:cBhvr>
+                                        <p:cTn id="16" dur="1" fill="hold">
+                                          <p:stCondLst>
+                                            <p:cond delay="0"/>
+                                          </p:stCondLst>
+                                        </p:cTn>
+                                        <p:tgtEl>
+                                          <p:spTgt spid="4">
+                                            <p:txEl>
+                                              <p:pRg st="6" end="6"/>
+                                            </p:txEl>
+                                          </p:spTgt>
+                                        </p:tgtEl>
+                                        <p:attrNameLst>
+                                          <p:attrName>style.visibility</p:attrName>
+                                        </p:attrNameLst>
+                                      </p:cBhvr>
+                                      <p:to>
+                                        <p:strVal val="visible"/>
+                                      </p:to>
+                                    </p:set>
+                                    <p:animEffect transition="in" filter="fade">
+                                      <p:cBhvr>
+                                        <p:cTn id="17" dur="500"/>
+                                        <p:tgtEl>
+                                          <p:spTgt spid="4">
+                                            <p:txEl>
+                                              <p:pRg st="6" end="6"/>
+                                            </p:txEl>
+                                          </p:spTgt>
+                                        </p:tgtEl>
+                                      </p:cBhvr>
+                                    </p:animEffect>
+                                  </p:childTnLst>
+                                </p:cTn>
+                              </p:par>
+                            </p:childTnLst>
+                          </p:cTn>
+                        </p:par>
+                      </p:childTnLst>
+                    </p:cTn>
+                  </p:par>
+                  <p:par>
+                    <p:cTn id="18" fill="hold">
+                      <p:stCondLst>
+                        <p:cond delay="indefinite"/>
+                      </p:stCondLst>
+                      <p:childTnLst>
+                        <p:par>
+                          <p:cTn id="19" fill="hold">
+                            <p:stCondLst>
+                              <p:cond delay="0"/>
+                            </p:stCondLst>
+                            <p:childTnLst>
+                              <p:par>
+                                <p:cTn id="20" presetID="10" presetClass="entr" presetSubtype="0" fill="hold" nodeType="clickEffect">
+                                  <p:stCondLst>
+                                    <p:cond delay="0"/>
+                                  </p:stCondLst>
+                                  <p:childTnLst>
+                                    <p:set>
+                                      <p:cBhvr>
+                                        <p:cTn id="21" dur="1" fill="hold">
+                                          <p:stCondLst>
+                                            <p:cond delay="0"/>
+                                          </p:stCondLst>
+                                        </p:cTn>
+                                        <p:tgtEl>
+                                          <p:spTgt spid="4099"/>
+                                        </p:tgtEl>
+                                        <p:attrNameLst>
+                                          <p:attrName>style.visibility</p:attrName>
+                                        </p:attrNameLst>
+                                      </p:cBhvr>
+                                      <p:to>
+                                        <p:strVal val="visible"/>
+                                      </p:to>
+                                    </p:set>
+                                    <p:animEffect transition="in" filter="fade">
+                                      <p:cBhvr>
+                                        <p:cTn id="22" dur="500"/>
+                                        <p:tgtEl>
+                                          <p:spTgt spid="4099"/>
+                                        </p:tgtEl>
+                                      </p:cBhvr>
+                                    </p:animEffect>
+                                  </p:childTnLst>
+                                </p:cTn>
+                              </p:par>
+                              <p:par>
+                                <p:cTn id="23" presetID="10" presetClass="entr" presetSubtype="0" fill="hold" nodeType="withEffect">
+                                  <p:stCondLst>
+                                    <p:cond delay="0"/>
+                                  </p:stCondLst>
+                                  <p:childTnLst>
+                                    <p:set>
+                                      <p:cBhvr>
+                                        <p:cTn id="24" dur="1" fill="hold">
+                                          <p:stCondLst>
+                                            <p:cond delay="0"/>
+                                          </p:stCondLst>
+                                        </p:cTn>
+                                        <p:tgtEl>
+                                          <p:spTgt spid="4100"/>
+                                        </p:tgtEl>
+                                        <p:attrNameLst>
+                                          <p:attrName>style.visibility</p:attrName>
+                                        </p:attrNameLst>
+                                      </p:cBhvr>
+                                      <p:to>
+                                        <p:strVal val="visible"/>
+                                      </p:to>
+                                    </p:set>
+                                    <p:animEffect transition="in" filter="fade">
+                                      <p:cBhvr>
+                                        <p:cTn id="25" dur="500"/>
+                                        <p:tgtEl>
+                                          <p:spTgt spid="4100"/>
+                                        </p:tgtEl>
+                                      </p:cBhvr>
+                                    </p:animEffect>
+                                  </p:childTnLst>
+                                </p:cTn>
+                              </p:par>
+                            </p:childTnLst>
+                          </p:cTn>
+                        </p:par>
+                      </p:childTnLst>
+                    </p:cTn>
+                  </p:par>
+                  <p:par>
+                    <p:cTn id="26" fill="hold">
+                      <p:stCondLst>
+                        <p:cond delay="indefinite"/>
+                      </p:stCondLst>
+                      <p:childTnLst>
+                        <p:par>
+                          <p:cTn id="27" fill="hold">
+                            <p:stCondLst>
+                              <p:cond delay="0"/>
+                            </p:stCondLst>
+                            <p:childTnLst>
+                              <p:par>
+                                <p:cTn id="28" presetID="10" presetClass="entr" presetSubtype="0" fill="hold" grpId="0" nodeType="clickEffect">
+                                  <p:stCondLst>
+                                    <p:cond delay="0"/>
+                                  </p:stCondLst>
+                                  <p:childTnLst>
+                                    <p:set>
+                                      <p:cBhvr>
+                                        <p:cTn id="29" dur="1" fill="hold">
+                                          <p:stCondLst>
+                                            <p:cond delay="0"/>
+                                          </p:stCondLst>
+                                        </p:cTn>
+                                        <p:tgtEl>
+                                          <p:spTgt spid="3">
+                                            <p:txEl>
+                                              <p:pRg st="0" end="0"/>
+                                            </p:txEl>
+                                          </p:spTgt>
+                                        </p:tgtEl>
+                                        <p:attrNameLst>
+                                          <p:attrName>style.visibility</p:attrName>
+                                        </p:attrNameLst>
+                                      </p:cBhvr>
+                                      <p:to>
+                                        <p:strVal val="visible"/>
+                                      </p:to>
+                                    </p:set>
+                                    <p:animEffect transition="in" filter="fade">
+                                      <p:cBhvr>
+                                        <p:cTn id="30" dur="500"/>
+                                        <p:tgtEl>
+                                          <p:spTgt spid="3">
+                                            <p:txEl>
+                                              <p:pRg st="0" end="0"/>
+                                            </p:txEl>
+                                          </p:spTgt>
+                                        </p:tgtEl>
+                                      </p:cBhvr>
+                                    </p:animEffect>
+                                  </p:childTnLst>
+                                </p:cTn>
+                              </p:par>
+                              <p:par>
+                                <p:cTn id="31" presetID="10" presetClass="entr" presetSubtype="0" fill="hold" nodeType="withEffect">
+                                  <p:stCondLst>
+                                    <p:cond delay="0"/>
+                                  </p:stCondLst>
+                                  <p:childTnLst>
+                                    <p:set>
+                                      <p:cBhvr>
+                                        <p:cTn id="32" dur="1" fill="hold">
+                                          <p:stCondLst>
+                                            <p:cond delay="0"/>
+                                          </p:stCondLst>
+                                        </p:cTn>
+                                        <p:tgtEl>
+                                          <p:spTgt spid="4101"/>
+                                        </p:tgtEl>
+                                        <p:attrNameLst>
+                                          <p:attrName>style.visibility</p:attrName>
+                                        </p:attrNameLst>
+                                      </p:cBhvr>
+                                      <p:to>
+                                        <p:strVal val="visible"/>
+                                      </p:to>
+                                    </p:set>
+                                    <p:animEffect transition="in" filter="fade">
+                                      <p:cBhvr>
+                                        <p:cTn id="33" dur="500"/>
+                                        <p:tgtEl>
+                                          <p:spTgt spid="4101"/>
+                                        </p:tgtEl>
+                                      </p:cBhvr>
+                                    </p:animEffect>
+                                  </p:childTnLst>
+                                </p:cTn>
+                              </p:par>
+                            </p:childTnLst>
+                          </p:cTn>
+                        </p:par>
+                      </p:childTnLst>
+                    </p:cTn>
+                  </p:par>
+                </p:childTnLst>
+              </p:cTn>
+              <p:prevCondLst>
+                <p:cond evt="onPrev" delay="0">
+                  <p:tgtEl>
+                    <p:sldTgt/>
+                  </p:tgtEl>
+                </p:cond>
+              </p:prevCondLst>
+              <p:nextCondLst>
+                <p:cond evt="onNext" delay="0">
+                  <p:tgtEl>
+                    <p:sldTgt/>
+                  </p:tgtEl>
+                </p:cond>
+              </p:nextCondLst>
+            </p:seq>
+          </p:childTnLst>
+        </p:cTn>
       </p:par>
     </p:tnLst>
+    <p:bldLst>
+      <p:bldP spid="3" grpId="0" build="p"/>
+    </p:bldLst>
   </p:timing>
 </p:sld>
 </file>
@@ -4697,7 +5881,222 @@
   <p:timing>
     <p:tnLst>
       <p:par>
-        <p:cTn id="1" dur="indefinite" restart="never" nodeType="tmRoot"/>
+        <p:cTn id="1" dur="indefinite" restart="never" nodeType="tmRoot">
+          <p:childTnLst>
+            <p:seq concurrent="1" nextAc="seek">
+              <p:cTn id="2" dur="indefinite" nodeType="mainSeq">
+                <p:childTnLst>
+                  <p:par>
+                    <p:cTn id="3" fill="hold">
+                      <p:stCondLst>
+                        <p:cond delay="indefinite"/>
+                      </p:stCondLst>
+                      <p:childTnLst>
+                        <p:par>
+                          <p:cTn id="4" fill="hold">
+                            <p:stCondLst>
+                              <p:cond delay="0"/>
+                            </p:stCondLst>
+                            <p:childTnLst>
+                              <p:par>
+                                <p:cTn id="5" presetID="10" presetClass="entr" presetSubtype="0" fill="hold" nodeType="clickEffect">
+                                  <p:stCondLst>
+                                    <p:cond delay="0"/>
+                                  </p:stCondLst>
+                                  <p:childTnLst>
+                                    <p:set>
+                                      <p:cBhvr>
+                                        <p:cTn id="6" dur="1" fill="hold">
+                                          <p:stCondLst>
+                                            <p:cond delay="0"/>
+                                          </p:stCondLst>
+                                        </p:cTn>
+                                        <p:tgtEl>
+                                          <p:spTgt spid="6">
+                                            <p:txEl>
+                                              <p:pRg st="0" end="0"/>
+                                            </p:txEl>
+                                          </p:spTgt>
+                                        </p:tgtEl>
+                                        <p:attrNameLst>
+                                          <p:attrName>style.visibility</p:attrName>
+                                        </p:attrNameLst>
+                                      </p:cBhvr>
+                                      <p:to>
+                                        <p:strVal val="visible"/>
+                                      </p:to>
+                                    </p:set>
+                                    <p:animEffect transition="in" filter="fade">
+                                      <p:cBhvr>
+                                        <p:cTn id="7" dur="500"/>
+                                        <p:tgtEl>
+                                          <p:spTgt spid="6">
+                                            <p:txEl>
+                                              <p:pRg st="0" end="0"/>
+                                            </p:txEl>
+                                          </p:spTgt>
+                                        </p:tgtEl>
+                                      </p:cBhvr>
+                                    </p:animEffect>
+                                  </p:childTnLst>
+                                </p:cTn>
+                              </p:par>
+                              <p:par>
+                                <p:cTn id="8" presetID="10" presetClass="entr" presetSubtype="0" fill="hold" nodeType="withEffect">
+                                  <p:stCondLst>
+                                    <p:cond delay="0"/>
+                                  </p:stCondLst>
+                                  <p:childTnLst>
+                                    <p:set>
+                                      <p:cBhvr>
+                                        <p:cTn id="9" dur="1" fill="hold">
+                                          <p:stCondLst>
+                                            <p:cond delay="0"/>
+                                          </p:stCondLst>
+                                        </p:cTn>
+                                        <p:tgtEl>
+                                          <p:spTgt spid="1026"/>
+                                        </p:tgtEl>
+                                        <p:attrNameLst>
+                                          <p:attrName>style.visibility</p:attrName>
+                                        </p:attrNameLst>
+                                      </p:cBhvr>
+                                      <p:to>
+                                        <p:strVal val="visible"/>
+                                      </p:to>
+                                    </p:set>
+                                    <p:animEffect transition="in" filter="fade">
+                                      <p:cBhvr>
+                                        <p:cTn id="10" dur="500"/>
+                                        <p:tgtEl>
+                                          <p:spTgt spid="1026"/>
+                                        </p:tgtEl>
+                                      </p:cBhvr>
+                                    </p:animEffect>
+                                  </p:childTnLst>
+                                </p:cTn>
+                              </p:par>
+                            </p:childTnLst>
+                          </p:cTn>
+                        </p:par>
+                      </p:childTnLst>
+                    </p:cTn>
+                  </p:par>
+                  <p:par>
+                    <p:cTn id="11" fill="hold">
+                      <p:stCondLst>
+                        <p:cond delay="indefinite"/>
+                      </p:stCondLst>
+                      <p:childTnLst>
+                        <p:par>
+                          <p:cTn id="12" fill="hold">
+                            <p:stCondLst>
+                              <p:cond delay="0"/>
+                            </p:stCondLst>
+                            <p:childTnLst>
+                              <p:par>
+                                <p:cTn id="13" presetID="10" presetClass="entr" presetSubtype="0" fill="hold" nodeType="clickEffect">
+                                  <p:stCondLst>
+                                    <p:cond delay="0"/>
+                                  </p:stCondLst>
+                                  <p:childTnLst>
+                                    <p:set>
+                                      <p:cBhvr>
+                                        <p:cTn id="14" dur="1" fill="hold">
+                                          <p:stCondLst>
+                                            <p:cond delay="0"/>
+                                          </p:stCondLst>
+                                        </p:cTn>
+                                        <p:tgtEl>
+                                          <p:spTgt spid="6">
+                                            <p:txEl>
+                                              <p:pRg st="5" end="5"/>
+                                            </p:txEl>
+                                          </p:spTgt>
+                                        </p:tgtEl>
+                                        <p:attrNameLst>
+                                          <p:attrName>style.visibility</p:attrName>
+                                        </p:attrNameLst>
+                                      </p:cBhvr>
+                                      <p:to>
+                                        <p:strVal val="visible"/>
+                                      </p:to>
+                                    </p:set>
+                                    <p:animEffect transition="in" filter="fade">
+                                      <p:cBhvr>
+                                        <p:cTn id="15" dur="500"/>
+                                        <p:tgtEl>
+                                          <p:spTgt spid="6">
+                                            <p:txEl>
+                                              <p:pRg st="5" end="5"/>
+                                            </p:txEl>
+                                          </p:spTgt>
+                                        </p:tgtEl>
+                                      </p:cBhvr>
+                                    </p:animEffect>
+                                  </p:childTnLst>
+                                </p:cTn>
+                              </p:par>
+                              <p:par>
+                                <p:cTn id="16" presetID="10" presetClass="entr" presetSubtype="0" fill="hold" nodeType="withEffect">
+                                  <p:stCondLst>
+                                    <p:cond delay="0"/>
+                                  </p:stCondLst>
+                                  <p:childTnLst>
+                                    <p:set>
+                                      <p:cBhvr>
+                                        <p:cTn id="17" dur="1" fill="hold">
+                                          <p:stCondLst>
+                                            <p:cond delay="0"/>
+                                          </p:stCondLst>
+                                        </p:cTn>
+                                        <p:tgtEl>
+                                          <p:spTgt spid="1027"/>
+                                        </p:tgtEl>
+                                        <p:attrNameLst>
+                                          <p:attrName>style.visibility</p:attrName>
+                                        </p:attrNameLst>
+                                      </p:cBhvr>
+                                      <p:to>
+                                        <p:strVal val="visible"/>
+                                      </p:to>
+                                    </p:set>
+                                    <p:animEffect transition="in" filter="fade">
+                                      <p:cBhvr>
+                                        <p:cTn id="18" dur="500"/>
+                                        <p:tgtEl>
+                                          <p:spTgt spid="1027"/>
+                                        </p:tgtEl>
+                                      </p:cBhvr>
+                                    </p:animEffect>
+                                  </p:childTnLst>
+                                </p:cTn>
+                              </p:par>
+                            </p:childTnLst>
+                          </p:cTn>
+                        </p:par>
+                      </p:childTnLst>
+                    </p:cTn>
+                  </p:par>
+                </p:childTnLst>
+              </p:cTn>
+              <p:prevCondLst>
+                <p:cond evt="onPrev" delay="0">
+                  <p:tgtEl>
+                    <p:sldTgt/>
+                  </p:tgtEl>
+                </p:cond>
+              </p:prevCondLst>
+              <p:nextCondLst>
+                <p:cond evt="onNext" delay="0">
+                  <p:tgtEl>
+                    <p:sldTgt/>
+                  </p:tgtEl>
+                </p:cond>
+              </p:nextCondLst>
+            </p:seq>
+          </p:childTnLst>
+        </p:cTn>
       </p:par>
     </p:tnLst>
   </p:timing>
@@ -5078,7 +6477,6 @@
               <a:rPr lang="fr-CH" dirty="0"/>
               <a:t> = −1,</a:t>
             </a:r>
-            <a:endParaRPr lang="fr-CH" dirty="0"/>
           </a:p>
         </p:txBody>
       </p:sp>
@@ -5095,9 +6493,299 @@
   <p:timing>
     <p:tnLst>
       <p:par>
-        <p:cTn id="1" dur="indefinite" restart="never" nodeType="tmRoot"/>
+        <p:cTn id="1" dur="indefinite" restart="never" nodeType="tmRoot">
+          <p:childTnLst>
+            <p:seq concurrent="1" nextAc="seek">
+              <p:cTn id="2" dur="indefinite" nodeType="mainSeq">
+                <p:childTnLst>
+                  <p:par>
+                    <p:cTn id="3" fill="hold">
+                      <p:stCondLst>
+                        <p:cond delay="indefinite"/>
+                      </p:stCondLst>
+                      <p:childTnLst>
+                        <p:par>
+                          <p:cTn id="4" fill="hold">
+                            <p:stCondLst>
+                              <p:cond delay="0"/>
+                            </p:stCondLst>
+                            <p:childTnLst>
+                              <p:par>
+                                <p:cTn id="5" presetID="10" presetClass="entr" presetSubtype="0" fill="hold" nodeType="clickEffect">
+                                  <p:stCondLst>
+                                    <p:cond delay="0"/>
+                                  </p:stCondLst>
+                                  <p:childTnLst>
+                                    <p:set>
+                                      <p:cBhvr>
+                                        <p:cTn id="6" dur="1" fill="hold">
+                                          <p:stCondLst>
+                                            <p:cond delay="0"/>
+                                          </p:stCondLst>
+                                        </p:cTn>
+                                        <p:tgtEl>
+                                          <p:spTgt spid="2050"/>
+                                        </p:tgtEl>
+                                        <p:attrNameLst>
+                                          <p:attrName>style.visibility</p:attrName>
+                                        </p:attrNameLst>
+                                      </p:cBhvr>
+                                      <p:to>
+                                        <p:strVal val="visible"/>
+                                      </p:to>
+                                    </p:set>
+                                    <p:animEffect transition="in" filter="fade">
+                                      <p:cBhvr>
+                                        <p:cTn id="7" dur="500"/>
+                                        <p:tgtEl>
+                                          <p:spTgt spid="2050"/>
+                                        </p:tgtEl>
+                                      </p:cBhvr>
+                                    </p:animEffect>
+                                  </p:childTnLst>
+                                </p:cTn>
+                              </p:par>
+                              <p:par>
+                                <p:cTn id="8" presetID="10" presetClass="entr" presetSubtype="0" fill="hold" nodeType="withEffect">
+                                  <p:stCondLst>
+                                    <p:cond delay="0"/>
+                                  </p:stCondLst>
+                                  <p:childTnLst>
+                                    <p:set>
+                                      <p:cBhvr>
+                                        <p:cTn id="9" dur="1" fill="hold">
+                                          <p:stCondLst>
+                                            <p:cond delay="0"/>
+                                          </p:stCondLst>
+                                        </p:cTn>
+                                        <p:tgtEl>
+                                          <p:spTgt spid="2052"/>
+                                        </p:tgtEl>
+                                        <p:attrNameLst>
+                                          <p:attrName>style.visibility</p:attrName>
+                                        </p:attrNameLst>
+                                      </p:cBhvr>
+                                      <p:to>
+                                        <p:strVal val="visible"/>
+                                      </p:to>
+                                    </p:set>
+                                    <p:animEffect transition="in" filter="fade">
+                                      <p:cBhvr>
+                                        <p:cTn id="10" dur="500"/>
+                                        <p:tgtEl>
+                                          <p:spTgt spid="2052"/>
+                                        </p:tgtEl>
+                                      </p:cBhvr>
+                                    </p:animEffect>
+                                  </p:childTnLst>
+                                </p:cTn>
+                              </p:par>
+                              <p:par>
+                                <p:cTn id="11" presetID="10" presetClass="entr" presetSubtype="0" fill="hold" grpId="0" nodeType="withEffect">
+                                  <p:stCondLst>
+                                    <p:cond delay="0"/>
+                                  </p:stCondLst>
+                                  <p:childTnLst>
+                                    <p:set>
+                                      <p:cBhvr>
+                                        <p:cTn id="12" dur="1" fill="hold">
+                                          <p:stCondLst>
+                                            <p:cond delay="0"/>
+                                          </p:stCondLst>
+                                        </p:cTn>
+                                        <p:tgtEl>
+                                          <p:spTgt spid="2">
+                                            <p:txEl>
+                                              <p:pRg st="0" end="0"/>
+                                            </p:txEl>
+                                          </p:spTgt>
+                                        </p:tgtEl>
+                                        <p:attrNameLst>
+                                          <p:attrName>style.visibility</p:attrName>
+                                        </p:attrNameLst>
+                                      </p:cBhvr>
+                                      <p:to>
+                                        <p:strVal val="visible"/>
+                                      </p:to>
+                                    </p:set>
+                                    <p:animEffect transition="in" filter="fade">
+                                      <p:cBhvr>
+                                        <p:cTn id="13" dur="500"/>
+                                        <p:tgtEl>
+                                          <p:spTgt spid="2">
+                                            <p:txEl>
+                                              <p:pRg st="0" end="0"/>
+                                            </p:txEl>
+                                          </p:spTgt>
+                                        </p:tgtEl>
+                                      </p:cBhvr>
+                                    </p:animEffect>
+                                  </p:childTnLst>
+                                </p:cTn>
+                              </p:par>
+                            </p:childTnLst>
+                          </p:cTn>
+                        </p:par>
+                      </p:childTnLst>
+                    </p:cTn>
+                  </p:par>
+                  <p:par>
+                    <p:cTn id="14" fill="hold">
+                      <p:stCondLst>
+                        <p:cond delay="indefinite"/>
+                      </p:stCondLst>
+                      <p:childTnLst>
+                        <p:par>
+                          <p:cTn id="15" fill="hold">
+                            <p:stCondLst>
+                              <p:cond delay="0"/>
+                            </p:stCondLst>
+                            <p:childTnLst>
+                              <p:par>
+                                <p:cTn id="16" presetID="10" presetClass="entr" presetSubtype="0" fill="hold" nodeType="clickEffect">
+                                  <p:stCondLst>
+                                    <p:cond delay="0"/>
+                                  </p:stCondLst>
+                                  <p:childTnLst>
+                                    <p:set>
+                                      <p:cBhvr>
+                                        <p:cTn id="17" dur="1" fill="hold">
+                                          <p:stCondLst>
+                                            <p:cond delay="0"/>
+                                          </p:stCondLst>
+                                        </p:cTn>
+                                        <p:tgtEl>
+                                          <p:spTgt spid="2053"/>
+                                        </p:tgtEl>
+                                        <p:attrNameLst>
+                                          <p:attrName>style.visibility</p:attrName>
+                                        </p:attrNameLst>
+                                      </p:cBhvr>
+                                      <p:to>
+                                        <p:strVal val="visible"/>
+                                      </p:to>
+                                    </p:set>
+                                    <p:animEffect transition="in" filter="fade">
+                                      <p:cBhvr>
+                                        <p:cTn id="18" dur="500"/>
+                                        <p:tgtEl>
+                                          <p:spTgt spid="2053"/>
+                                        </p:tgtEl>
+                                      </p:cBhvr>
+                                    </p:animEffect>
+                                  </p:childTnLst>
+                                </p:cTn>
+                              </p:par>
+                              <p:par>
+                                <p:cTn id="19" presetID="10" presetClass="entr" presetSubtype="0" fill="hold" grpId="0" nodeType="withEffect">
+                                  <p:stCondLst>
+                                    <p:cond delay="0"/>
+                                  </p:stCondLst>
+                                  <p:childTnLst>
+                                    <p:set>
+                                      <p:cBhvr>
+                                        <p:cTn id="20" dur="1" fill="hold">
+                                          <p:stCondLst>
+                                            <p:cond delay="0"/>
+                                          </p:stCondLst>
+                                        </p:cTn>
+                                        <p:tgtEl>
+                                          <p:spTgt spid="6">
+                                            <p:txEl>
+                                              <p:pRg st="0" end="0"/>
+                                            </p:txEl>
+                                          </p:spTgt>
+                                        </p:tgtEl>
+                                        <p:attrNameLst>
+                                          <p:attrName>style.visibility</p:attrName>
+                                        </p:attrNameLst>
+                                      </p:cBhvr>
+                                      <p:to>
+                                        <p:strVal val="visible"/>
+                                      </p:to>
+                                    </p:set>
+                                    <p:animEffect transition="in" filter="fade">
+                                      <p:cBhvr>
+                                        <p:cTn id="21" dur="500"/>
+                                        <p:tgtEl>
+                                          <p:spTgt spid="6">
+                                            <p:txEl>
+                                              <p:pRg st="0" end="0"/>
+                                            </p:txEl>
+                                          </p:spTgt>
+                                        </p:tgtEl>
+                                      </p:cBhvr>
+                                    </p:animEffect>
+                                  </p:childTnLst>
+                                </p:cTn>
+                              </p:par>
+                              <p:par>
+                                <p:cTn id="22" presetID="10" presetClass="entr" presetSubtype="0" fill="hold" grpId="0" nodeType="withEffect">
+                                  <p:stCondLst>
+                                    <p:cond delay="0"/>
+                                  </p:stCondLst>
+                                  <p:childTnLst>
+                                    <p:set>
+                                      <p:cBhvr>
+                                        <p:cTn id="23" dur="1" fill="hold">
+                                          <p:stCondLst>
+                                            <p:cond delay="0"/>
+                                          </p:stCondLst>
+                                        </p:cTn>
+                                        <p:tgtEl>
+                                          <p:spTgt spid="3"/>
+                                        </p:tgtEl>
+                                        <p:attrNameLst>
+                                          <p:attrName>style.visibility</p:attrName>
+                                        </p:attrNameLst>
+                                      </p:cBhvr>
+                                      <p:to>
+                                        <p:strVal val="visible"/>
+                                      </p:to>
+                                    </p:set>
+                                    <p:animEffect transition="in" filter="fade">
+                                      <p:cBhvr>
+                                        <p:cTn id="24" dur="500"/>
+                                        <p:tgtEl>
+                                          <p:spTgt spid="3"/>
+                                        </p:tgtEl>
+                                      </p:cBhvr>
+                                    </p:animEffect>
+                                  </p:childTnLst>
+                                </p:cTn>
+                              </p:par>
+                            </p:childTnLst>
+                          </p:cTn>
+                        </p:par>
+                      </p:childTnLst>
+                    </p:cTn>
+                  </p:par>
+                </p:childTnLst>
+              </p:cTn>
+              <p:prevCondLst>
+                <p:cond evt="onPrev" delay="0">
+                  <p:tgtEl>
+                    <p:sldTgt/>
+                  </p:tgtEl>
+                </p:cond>
+              </p:prevCondLst>
+              <p:nextCondLst>
+                <p:cond evt="onNext" delay="0">
+                  <p:tgtEl>
+                    <p:sldTgt/>
+                  </p:tgtEl>
+                </p:cond>
+              </p:nextCondLst>
+            </p:seq>
+          </p:childTnLst>
+        </p:cTn>
       </p:par>
     </p:tnLst>
+    <p:bldLst>
+      <p:bldP spid="6" grpId="0" build="p"/>
+      <p:bldP spid="2" grpId="0" build="p"/>
+      <p:bldP spid="3" grpId="0"/>
+    </p:bldLst>
   </p:timing>
 </p:sld>
 </file>
@@ -5375,7 +7063,403 @@
   <p:timing>
     <p:tnLst>
       <p:par>
-        <p:cTn id="1" dur="indefinite" restart="never" nodeType="tmRoot"/>
+        <p:cTn id="1" dur="indefinite" restart="never" nodeType="tmRoot">
+          <p:childTnLst>
+            <p:seq concurrent="1" nextAc="seek">
+              <p:cTn id="2" dur="indefinite" nodeType="mainSeq">
+                <p:childTnLst>
+                  <p:par>
+                    <p:cTn id="3" fill="hold">
+                      <p:stCondLst>
+                        <p:cond delay="indefinite"/>
+                      </p:stCondLst>
+                      <p:childTnLst>
+                        <p:par>
+                          <p:cTn id="4" fill="hold">
+                            <p:stCondLst>
+                              <p:cond delay="0"/>
+                            </p:stCondLst>
+                            <p:childTnLst>
+                              <p:par>
+                                <p:cTn id="5" presetID="10" presetClass="entr" presetSubtype="0" fill="hold" nodeType="clickEffect">
+                                  <p:stCondLst>
+                                    <p:cond delay="0"/>
+                                  </p:stCondLst>
+                                  <p:childTnLst>
+                                    <p:set>
+                                      <p:cBhvr>
+                                        <p:cTn id="6" dur="1" fill="hold">
+                                          <p:stCondLst>
+                                            <p:cond delay="0"/>
+                                          </p:stCondLst>
+                                        </p:cTn>
+                                        <p:tgtEl>
+                                          <p:spTgt spid="6">
+                                            <p:txEl>
+                                              <p:pRg st="0" end="0"/>
+                                            </p:txEl>
+                                          </p:spTgt>
+                                        </p:tgtEl>
+                                        <p:attrNameLst>
+                                          <p:attrName>style.visibility</p:attrName>
+                                        </p:attrNameLst>
+                                      </p:cBhvr>
+                                      <p:to>
+                                        <p:strVal val="visible"/>
+                                      </p:to>
+                                    </p:set>
+                                    <p:animEffect transition="in" filter="fade">
+                                      <p:cBhvr>
+                                        <p:cTn id="7" dur="500"/>
+                                        <p:tgtEl>
+                                          <p:spTgt spid="6">
+                                            <p:txEl>
+                                              <p:pRg st="0" end="0"/>
+                                            </p:txEl>
+                                          </p:spTgt>
+                                        </p:tgtEl>
+                                      </p:cBhvr>
+                                    </p:animEffect>
+                                  </p:childTnLst>
+                                </p:cTn>
+                              </p:par>
+                              <p:par>
+                                <p:cTn id="8" presetID="10" presetClass="entr" presetSubtype="0" fill="hold" nodeType="withEffect">
+                                  <p:stCondLst>
+                                    <p:cond delay="0"/>
+                                  </p:stCondLst>
+                                  <p:childTnLst>
+                                    <p:set>
+                                      <p:cBhvr>
+                                        <p:cTn id="9" dur="1" fill="hold">
+                                          <p:stCondLst>
+                                            <p:cond delay="0"/>
+                                          </p:stCondLst>
+                                        </p:cTn>
+                                        <p:tgtEl>
+                                          <p:spTgt spid="6">
+                                            <p:txEl>
+                                              <p:pRg st="1" end="1"/>
+                                            </p:txEl>
+                                          </p:spTgt>
+                                        </p:tgtEl>
+                                        <p:attrNameLst>
+                                          <p:attrName>style.visibility</p:attrName>
+                                        </p:attrNameLst>
+                                      </p:cBhvr>
+                                      <p:to>
+                                        <p:strVal val="visible"/>
+                                      </p:to>
+                                    </p:set>
+                                    <p:animEffect transition="in" filter="fade">
+                                      <p:cBhvr>
+                                        <p:cTn id="10" dur="500"/>
+                                        <p:tgtEl>
+                                          <p:spTgt spid="6">
+                                            <p:txEl>
+                                              <p:pRg st="1" end="1"/>
+                                            </p:txEl>
+                                          </p:spTgt>
+                                        </p:tgtEl>
+                                      </p:cBhvr>
+                                    </p:animEffect>
+                                  </p:childTnLst>
+                                </p:cTn>
+                              </p:par>
+                              <p:par>
+                                <p:cTn id="11" presetID="10" presetClass="entr" presetSubtype="0" fill="hold" nodeType="withEffect">
+                                  <p:stCondLst>
+                                    <p:cond delay="0"/>
+                                  </p:stCondLst>
+                                  <p:childTnLst>
+                                    <p:set>
+                                      <p:cBhvr>
+                                        <p:cTn id="12" dur="1" fill="hold">
+                                          <p:stCondLst>
+                                            <p:cond delay="0"/>
+                                          </p:stCondLst>
+                                        </p:cTn>
+                                        <p:tgtEl>
+                                          <p:spTgt spid="6">
+                                            <p:txEl>
+                                              <p:pRg st="2" end="2"/>
+                                            </p:txEl>
+                                          </p:spTgt>
+                                        </p:tgtEl>
+                                        <p:attrNameLst>
+                                          <p:attrName>style.visibility</p:attrName>
+                                        </p:attrNameLst>
+                                      </p:cBhvr>
+                                      <p:to>
+                                        <p:strVal val="visible"/>
+                                      </p:to>
+                                    </p:set>
+                                    <p:animEffect transition="in" filter="fade">
+                                      <p:cBhvr>
+                                        <p:cTn id="13" dur="500"/>
+                                        <p:tgtEl>
+                                          <p:spTgt spid="6">
+                                            <p:txEl>
+                                              <p:pRg st="2" end="2"/>
+                                            </p:txEl>
+                                          </p:spTgt>
+                                        </p:tgtEl>
+                                      </p:cBhvr>
+                                    </p:animEffect>
+                                  </p:childTnLst>
+                                </p:cTn>
+                              </p:par>
+                            </p:childTnLst>
+                          </p:cTn>
+                        </p:par>
+                      </p:childTnLst>
+                    </p:cTn>
+                  </p:par>
+                  <p:par>
+                    <p:cTn id="14" fill="hold">
+                      <p:stCondLst>
+                        <p:cond delay="indefinite"/>
+                      </p:stCondLst>
+                      <p:childTnLst>
+                        <p:par>
+                          <p:cTn id="15" fill="hold">
+                            <p:stCondLst>
+                              <p:cond delay="0"/>
+                            </p:stCondLst>
+                            <p:childTnLst>
+                              <p:par>
+                                <p:cTn id="16" presetID="10" presetClass="entr" presetSubtype="0" fill="hold" nodeType="clickEffect">
+                                  <p:stCondLst>
+                                    <p:cond delay="0"/>
+                                  </p:stCondLst>
+                                  <p:childTnLst>
+                                    <p:set>
+                                      <p:cBhvr>
+                                        <p:cTn id="17" dur="1" fill="hold">
+                                          <p:stCondLst>
+                                            <p:cond delay="0"/>
+                                          </p:stCondLst>
+                                        </p:cTn>
+                                        <p:tgtEl>
+                                          <p:spTgt spid="6">
+                                            <p:txEl>
+                                              <p:pRg st="3" end="3"/>
+                                            </p:txEl>
+                                          </p:spTgt>
+                                        </p:tgtEl>
+                                        <p:attrNameLst>
+                                          <p:attrName>style.visibility</p:attrName>
+                                        </p:attrNameLst>
+                                      </p:cBhvr>
+                                      <p:to>
+                                        <p:strVal val="visible"/>
+                                      </p:to>
+                                    </p:set>
+                                    <p:animEffect transition="in" filter="fade">
+                                      <p:cBhvr>
+                                        <p:cTn id="18" dur="500"/>
+                                        <p:tgtEl>
+                                          <p:spTgt spid="6">
+                                            <p:txEl>
+                                              <p:pRg st="3" end="3"/>
+                                            </p:txEl>
+                                          </p:spTgt>
+                                        </p:tgtEl>
+                                      </p:cBhvr>
+                                    </p:animEffect>
+                                  </p:childTnLst>
+                                </p:cTn>
+                              </p:par>
+                              <p:par>
+                                <p:cTn id="19" presetID="10" presetClass="entr" presetSubtype="0" fill="hold" nodeType="withEffect">
+                                  <p:stCondLst>
+                                    <p:cond delay="0"/>
+                                  </p:stCondLst>
+                                  <p:childTnLst>
+                                    <p:set>
+                                      <p:cBhvr>
+                                        <p:cTn id="20" dur="1" fill="hold">
+                                          <p:stCondLst>
+                                            <p:cond delay="0"/>
+                                          </p:stCondLst>
+                                        </p:cTn>
+                                        <p:tgtEl>
+                                          <p:spTgt spid="6">
+                                            <p:txEl>
+                                              <p:pRg st="4" end="4"/>
+                                            </p:txEl>
+                                          </p:spTgt>
+                                        </p:tgtEl>
+                                        <p:attrNameLst>
+                                          <p:attrName>style.visibility</p:attrName>
+                                        </p:attrNameLst>
+                                      </p:cBhvr>
+                                      <p:to>
+                                        <p:strVal val="visible"/>
+                                      </p:to>
+                                    </p:set>
+                                    <p:animEffect transition="in" filter="fade">
+                                      <p:cBhvr>
+                                        <p:cTn id="21" dur="500"/>
+                                        <p:tgtEl>
+                                          <p:spTgt spid="6">
+                                            <p:txEl>
+                                              <p:pRg st="4" end="4"/>
+                                            </p:txEl>
+                                          </p:spTgt>
+                                        </p:tgtEl>
+                                      </p:cBhvr>
+                                    </p:animEffect>
+                                  </p:childTnLst>
+                                </p:cTn>
+                              </p:par>
+                            </p:childTnLst>
+                          </p:cTn>
+                        </p:par>
+                      </p:childTnLst>
+                    </p:cTn>
+                  </p:par>
+                  <p:par>
+                    <p:cTn id="22" fill="hold">
+                      <p:stCondLst>
+                        <p:cond delay="indefinite"/>
+                      </p:stCondLst>
+                      <p:childTnLst>
+                        <p:par>
+                          <p:cTn id="23" fill="hold">
+                            <p:stCondLst>
+                              <p:cond delay="0"/>
+                            </p:stCondLst>
+                            <p:childTnLst>
+                              <p:par>
+                                <p:cTn id="24" presetID="10" presetClass="entr" presetSubtype="0" fill="hold" nodeType="clickEffect">
+                                  <p:stCondLst>
+                                    <p:cond delay="0"/>
+                                  </p:stCondLst>
+                                  <p:childTnLst>
+                                    <p:set>
+                                      <p:cBhvr>
+                                        <p:cTn id="25" dur="1" fill="hold">
+                                          <p:stCondLst>
+                                            <p:cond delay="0"/>
+                                          </p:stCondLst>
+                                        </p:cTn>
+                                        <p:tgtEl>
+                                          <p:spTgt spid="6">
+                                            <p:txEl>
+                                              <p:pRg st="5" end="5"/>
+                                            </p:txEl>
+                                          </p:spTgt>
+                                        </p:tgtEl>
+                                        <p:attrNameLst>
+                                          <p:attrName>style.visibility</p:attrName>
+                                        </p:attrNameLst>
+                                      </p:cBhvr>
+                                      <p:to>
+                                        <p:strVal val="visible"/>
+                                      </p:to>
+                                    </p:set>
+                                    <p:animEffect transition="in" filter="fade">
+                                      <p:cBhvr>
+                                        <p:cTn id="26" dur="500"/>
+                                        <p:tgtEl>
+                                          <p:spTgt spid="6">
+                                            <p:txEl>
+                                              <p:pRg st="5" end="5"/>
+                                            </p:txEl>
+                                          </p:spTgt>
+                                        </p:tgtEl>
+                                      </p:cBhvr>
+                                    </p:animEffect>
+                                  </p:childTnLst>
+                                </p:cTn>
+                              </p:par>
+                            </p:childTnLst>
+                          </p:cTn>
+                        </p:par>
+                      </p:childTnLst>
+                    </p:cTn>
+                  </p:par>
+                  <p:par>
+                    <p:cTn id="27" fill="hold">
+                      <p:stCondLst>
+                        <p:cond delay="indefinite"/>
+                      </p:stCondLst>
+                      <p:childTnLst>
+                        <p:par>
+                          <p:cTn id="28" fill="hold">
+                            <p:stCondLst>
+                              <p:cond delay="0"/>
+                            </p:stCondLst>
+                            <p:childTnLst>
+                              <p:par>
+                                <p:cTn id="29" presetID="10" presetClass="entr" presetSubtype="0" fill="hold" nodeType="clickEffect">
+                                  <p:stCondLst>
+                                    <p:cond delay="0"/>
+                                  </p:stCondLst>
+                                  <p:childTnLst>
+                                    <p:set>
+                                      <p:cBhvr>
+                                        <p:cTn id="30" dur="1" fill="hold">
+                                          <p:stCondLst>
+                                            <p:cond delay="0"/>
+                                          </p:stCondLst>
+                                        </p:cTn>
+                                        <p:tgtEl>
+                                          <p:spTgt spid="6">
+                                            <p:txEl>
+                                              <p:pRg st="6" end="6"/>
+                                            </p:txEl>
+                                          </p:spTgt>
+                                        </p:tgtEl>
+                                        <p:attrNameLst>
+                                          <p:attrName>style.visibility</p:attrName>
+                                        </p:attrNameLst>
+                                      </p:cBhvr>
+                                      <p:to>
+                                        <p:strVal val="visible"/>
+                                      </p:to>
+                                    </p:set>
+                                    <p:animEffect transition="in" filter="fade">
+                                      <p:cBhvr>
+                                        <p:cTn id="31" dur="500"/>
+                                        <p:tgtEl>
+                                          <p:spTgt spid="6">
+                                            <p:txEl>
+                                              <p:pRg st="6" end="6"/>
+                                            </p:txEl>
+                                          </p:spTgt>
+                                        </p:tgtEl>
+                                      </p:cBhvr>
+                                    </p:animEffect>
+                                  </p:childTnLst>
+                                </p:cTn>
+                              </p:par>
+                            </p:childTnLst>
+                          </p:cTn>
+                        </p:par>
+                      </p:childTnLst>
+                    </p:cTn>
+                  </p:par>
+                </p:childTnLst>
+              </p:cTn>
+              <p:prevCondLst>
+                <p:cond evt="onPrev" delay="0">
+                  <p:tgtEl>
+                    <p:sldTgt/>
+                  </p:tgtEl>
+                </p:cond>
+              </p:prevCondLst>
+              <p:nextCondLst>
+                <p:cond evt="onNext" delay="0">
+                  <p:tgtEl>
+                    <p:sldTgt/>
+                  </p:tgtEl>
+                </p:cond>
+              </p:nextCondLst>
+            </p:seq>
+          </p:childTnLst>
+        </p:cTn>
       </p:par>
     </p:tnLst>
   </p:timing>

</xml_diff>

<commit_message>
user guide et presentation final
</commit_message>
<xml_diff>
--- a/Presentation/MatrixLite.pptx
+++ b/Presentation/MatrixLite.pptx
@@ -6410,6 +6410,159 @@
           </a:p>
         </p:txBody>
       </p:sp>
+      <mc:AlternateContent xmlns:mc="http://schemas.openxmlformats.org/markup-compatibility/2006" xmlns:a14="http://schemas.microsoft.com/office/drawing/2010/main">
+        <mc:Choice Requires="a14">
+          <p:sp>
+            <p:nvSpPr>
+              <p:cNvPr id="4" name="ZoneTexte 3"/>
+              <p:cNvSpPr txBox="1"/>
+              <p:nvPr/>
+            </p:nvSpPr>
+            <p:spPr>
+              <a:xfrm>
+                <a:off x="1647039" y="5699144"/>
+                <a:ext cx="1244693" cy="381451"/>
+              </a:xfrm>
+              <a:prstGeom prst="rect">
+                <a:avLst/>
+              </a:prstGeom>
+              <a:noFill/>
+            </p:spPr>
+            <p:txBody>
+              <a:bodyPr wrap="square" rtlCol="0">
+                <a:spAutoFit/>
+              </a:bodyPr>
+              <a:lstStyle/>
+              <a:p>
+                <a:pPr/>
+                <a14:m>
+                  <m:oMathPara xmlns:m="http://schemas.openxmlformats.org/officeDocument/2006/math">
+                    <m:oMathParaPr>
+                      <m:jc m:val="centerGroup"/>
+                    </m:oMathParaPr>
+                    <m:oMath xmlns:m="http://schemas.openxmlformats.org/officeDocument/2006/math">
+                      <m:sSup>
+                        <m:sSupPr>
+                          <m:ctrlPr>
+                            <a:rPr lang="en-GB" b="0" i="1" smtClean="0">
+                              <a:latin typeface="Cambria Math"/>
+                            </a:rPr>
+                          </m:ctrlPr>
+                        </m:sSupPr>
+                        <m:e>
+                          <m:r>
+                            <a:rPr lang="en-GB" b="0" i="1" smtClean="0">
+                              <a:latin typeface="Cambria Math"/>
+                            </a:rPr>
+                            <m:t>𝑧</m:t>
+                          </m:r>
+                        </m:e>
+                        <m:sup>
+                          <m:r>
+                            <a:rPr lang="en-GB" b="0" i="1" smtClean="0">
+                              <a:latin typeface="Cambria Math"/>
+                            </a:rPr>
+                            <m:t>′</m:t>
+                          </m:r>
+                        </m:sup>
+                      </m:sSup>
+                      <m:r>
+                        <a:rPr lang="en-GB" b="0" i="1" smtClean="0">
+                          <a:latin typeface="Cambria Math"/>
+                        </a:rPr>
+                        <m:t>=</m:t>
+                      </m:r>
+                      <m:r>
+                        <a:rPr lang="en-GB" b="0" i="1" smtClean="0">
+                          <a:latin typeface="Cambria Math"/>
+                        </a:rPr>
+                        <m:t>𝑧</m:t>
+                      </m:r>
+                      <m:r>
+                        <a:rPr lang="en-GB" b="0" i="1" smtClean="0">
+                          <a:latin typeface="Cambria Math"/>
+                        </a:rPr>
+                        <m:t> </m:t>
+                      </m:r>
+                      <m:sSup>
+                        <m:sSupPr>
+                          <m:ctrlPr>
+                            <a:rPr lang="en-GB" b="0" i="1" smtClean="0">
+                              <a:latin typeface="Cambria Math"/>
+                            </a:rPr>
+                          </m:ctrlPr>
+                        </m:sSupPr>
+                        <m:e>
+                          <m:r>
+                            <a:rPr lang="en-GB" b="0" i="1" smtClean="0">
+                              <a:latin typeface="Cambria Math"/>
+                            </a:rPr>
+                            <m:t>𝑒</m:t>
+                          </m:r>
+                        </m:e>
+                        <m:sup>
+                          <m:r>
+                            <a:rPr lang="en-GB" b="0" i="1" smtClean="0">
+                              <a:latin typeface="Cambria Math"/>
+                            </a:rPr>
+                            <m:t>𝑖</m:t>
+                          </m:r>
+                          <m:r>
+                            <a:rPr lang="en-GB" b="0" i="1" smtClean="0">
+                              <a:latin typeface="Cambria Math"/>
+                              <a:ea typeface="Cambria Math"/>
+                            </a:rPr>
+                            <m:t>𝜃</m:t>
+                          </m:r>
+                        </m:sup>
+                      </m:sSup>
+                    </m:oMath>
+                  </m:oMathPara>
+                </a14:m>
+                <a:endParaRPr lang="fr-CH" dirty="0"/>
+              </a:p>
+            </p:txBody>
+          </p:sp>
+        </mc:Choice>
+        <mc:Fallback xmlns="">
+          <p:sp>
+            <p:nvSpPr>
+              <p:cNvPr id="4" name="ZoneTexte 3"/>
+              <p:cNvSpPr txBox="1">
+                <a:spLocks noRot="1" noChangeAspect="1" noMove="1" noResize="1" noEditPoints="1" noAdjustHandles="1" noChangeArrowheads="1" noChangeShapeType="1" noTextEdit="1"/>
+              </p:cNvSpPr>
+              <p:nvPr/>
+            </p:nvSpPr>
+            <p:spPr>
+              <a:xfrm>
+                <a:off x="1647039" y="5699144"/>
+                <a:ext cx="1244693" cy="381451"/>
+              </a:xfrm>
+              <a:prstGeom prst="rect">
+                <a:avLst/>
+              </a:prstGeom>
+              <a:blipFill rotWithShape="1">
+                <a:blip r:embed="rId5"/>
+                <a:stretch>
+                  <a:fillRect/>
+                </a:stretch>
+              </a:blipFill>
+            </p:spPr>
+            <p:txBody>
+              <a:bodyPr/>
+              <a:lstStyle/>
+              <a:p>
+                <a:r>
+                  <a:rPr lang="fr-CH">
+                    <a:noFill/>
+                  </a:rPr>
+                  <a:t> </a:t>
+                </a:r>
+              </a:p>
+            </p:txBody>
+          </p:sp>
+        </mc:Fallback>
+      </mc:AlternateContent>
     </p:spTree>
     <p:extLst>
       <p:ext uri="{BB962C8B-B14F-4D97-AF65-F5344CB8AC3E}">
@@ -6553,6 +6706,41 @@
                                   </p:childTnLst>
                                 </p:cTn>
                               </p:par>
+                              <p:par>
+                                <p:cTn id="14" presetID="10" presetClass="entr" presetSubtype="0" fill="hold" grpId="0" nodeType="withEffect">
+                                  <p:stCondLst>
+                                    <p:cond delay="0"/>
+                                  </p:stCondLst>
+                                  <p:childTnLst>
+                                    <p:set>
+                                      <p:cBhvr>
+                                        <p:cTn id="15" dur="1" fill="hold">
+                                          <p:stCondLst>
+                                            <p:cond delay="0"/>
+                                          </p:stCondLst>
+                                        </p:cTn>
+                                        <p:tgtEl>
+                                          <p:spTgt spid="4"/>
+                                        </p:tgtEl>
+                                        <p:attrNameLst>
+                                          <p:attrName>style.visibility</p:attrName>
+                                        </p:attrNameLst>
+                                      </p:cBhvr>
+                                      <p:to>
+                                        <p:strVal val="visible"/>
+                                      </p:to>
+                                    </p:set>
+                                    <p:animEffect transition="in" filter="fade">
+                                      <p:cBhvr>
+                                        <p:cTn id="16" dur="500"/>
+                                        <p:tgtEl>
+                                          <p:spTgt spid="4"/>
+                                        </p:tgtEl>
+                                      </p:cBhvr>
+                                    </p:animEffect>
+                                  </p:childTnLst>
+                                </p:cTn>
+                              </p:par>
                             </p:childTnLst>
                           </p:cTn>
                         </p:par>
@@ -6560,26 +6748,26 @@
                     </p:cTn>
                   </p:par>
                   <p:par>
-                    <p:cTn id="14" fill="hold">
+                    <p:cTn id="17" fill="hold">
                       <p:stCondLst>
                         <p:cond delay="indefinite"/>
                       </p:stCondLst>
                       <p:childTnLst>
                         <p:par>
-                          <p:cTn id="15" fill="hold">
+                          <p:cTn id="18" fill="hold">
                             <p:stCondLst>
                               <p:cond delay="0"/>
                             </p:stCondLst>
                             <p:childTnLst>
                               <p:par>
-                                <p:cTn id="16" presetID="10" presetClass="entr" presetSubtype="0" fill="hold" nodeType="clickEffect">
+                                <p:cTn id="19" presetID="10" presetClass="entr" presetSubtype="0" fill="hold" nodeType="clickEffect">
                                   <p:stCondLst>
                                     <p:cond delay="0"/>
                                   </p:stCondLst>
                                   <p:childTnLst>
                                     <p:set>
                                       <p:cBhvr>
-                                        <p:cTn id="17" dur="1" fill="hold">
+                                        <p:cTn id="20" dur="1" fill="hold">
                                           <p:stCondLst>
                                             <p:cond delay="0"/>
                                           </p:stCondLst>
@@ -6597,7 +6785,7 @@
                                     </p:set>
                                     <p:animEffect transition="in" filter="fade">
                                       <p:cBhvr>
-                                        <p:cTn id="18" dur="500"/>
+                                        <p:cTn id="21" dur="500"/>
                                         <p:tgtEl>
                                           <p:spTgt spid="2053"/>
                                         </p:tgtEl>
@@ -6607,14 +6795,14 @@
                                 </p:cTn>
                               </p:par>
                               <p:par>
-                                <p:cTn id="19" presetID="10" presetClass="entr" presetSubtype="0" fill="hold" grpId="0" nodeType="withEffect">
+                                <p:cTn id="22" presetID="10" presetClass="entr" presetSubtype="0" fill="hold" grpId="0" nodeType="withEffect">
                                   <p:stCondLst>
                                     <p:cond delay="0"/>
                                   </p:stCondLst>
                                   <p:childTnLst>
                                     <p:set>
                                       <p:cBhvr>
-                                        <p:cTn id="20" dur="1" fill="hold">
+                                        <p:cTn id="23" dur="1" fill="hold">
                                           <p:stCondLst>
                                             <p:cond delay="0"/>
                                           </p:stCondLst>
@@ -6636,7 +6824,7 @@
                                     </p:set>
                                     <p:animEffect transition="in" filter="fade">
                                       <p:cBhvr>
-                                        <p:cTn id="21" dur="500"/>
+                                        <p:cTn id="24" dur="500"/>
                                         <p:tgtEl>
                                           <p:spTgt spid="6">
                                             <p:txEl>
@@ -6650,14 +6838,14 @@
                                 </p:cTn>
                               </p:par>
                               <p:par>
-                                <p:cTn id="22" presetID="10" presetClass="entr" presetSubtype="0" fill="hold" grpId="0" nodeType="withEffect">
+                                <p:cTn id="25" presetID="10" presetClass="entr" presetSubtype="0" fill="hold" grpId="0" nodeType="withEffect">
                                   <p:stCondLst>
                                     <p:cond delay="0"/>
                                   </p:stCondLst>
                                   <p:childTnLst>
                                     <p:set>
                                       <p:cBhvr>
-                                        <p:cTn id="23" dur="1" fill="hold">
+                                        <p:cTn id="26" dur="1" fill="hold">
                                           <p:stCondLst>
                                             <p:cond delay="0"/>
                                           </p:stCondLst>
@@ -6675,7 +6863,7 @@
                                     </p:set>
                                     <p:animEffect transition="in" filter="fade">
                                       <p:cBhvr>
-                                        <p:cTn id="24" dur="500"/>
+                                        <p:cTn id="27" dur="500"/>
                                         <p:tgtEl>
                                           <p:spTgt spid="3"/>
                                         </p:tgtEl>
@@ -6715,6 +6903,7 @@
       <p:bldP spid="6" grpId="0" build="p"/>
       <p:bldP spid="2" grpId="0" build="p"/>
       <p:bldP spid="3" grpId="0"/>
+      <p:bldP spid="4" grpId="0"/>
     </p:bldLst>
   </p:timing>
 </p:sld>
@@ -6914,24 +7103,12 @@
           </a:p>
           <a:p>
             <a:r>
+              <a:rPr lang="en-GB" dirty="0" err="1"/>
+              <a:t>M</a:t>
+            </a:r>
+            <a:r>
               <a:rPr lang="en-GB" dirty="0" err="1" smtClean="0"/>
-              <a:t>Moins</a:t>
-            </a:r>
-            <a:r>
-              <a:rPr lang="en-GB" dirty="0" smtClean="0"/>
-              <a:t> de </a:t>
-            </a:r>
-            <a:r>
-              <a:rPr lang="en-GB" dirty="0" err="1" smtClean="0"/>
-              <a:t>calculs</a:t>
-            </a:r>
-            <a:r>
-              <a:rPr lang="en-GB" dirty="0" smtClean="0"/>
-              <a:t>, </a:t>
-            </a:r>
-            <a:r>
-              <a:rPr lang="en-GB" dirty="0" err="1" smtClean="0"/>
-              <a:t>donc</a:t>
+              <a:t>oins</a:t>
             </a:r>
             <a:r>
               <a:rPr lang="en-GB" dirty="0" smtClean="0"/>
@@ -6939,7 +7116,7 @@
             </a:r>
             <a:r>
               <a:rPr lang="en-GB" dirty="0" err="1" smtClean="0"/>
-              <a:t>moins</a:t>
+              <a:t>d’étapes</a:t>
             </a:r>
             <a:r>
               <a:rPr lang="en-GB" dirty="0" smtClean="0"/>
@@ -6947,14 +7124,6 @@
             </a:r>
             <a:r>
               <a:rPr lang="en-GB" dirty="0" err="1" smtClean="0"/>
-              <a:t>d’étapes</a:t>
-            </a:r>
-            <a:r>
-              <a:rPr lang="en-GB" dirty="0" smtClean="0"/>
-              <a:t> </a:t>
-            </a:r>
-            <a:r>
-              <a:rPr lang="en-GB" dirty="0" err="1" smtClean="0"/>
               <a:t>intermédiaires</a:t>
             </a:r>
             <a:endParaRPr lang="fr-CH" dirty="0" smtClean="0"/>
@@ -6964,6 +7133,357 @@
           </a:p>
         </p:txBody>
       </p:sp>
+      <mc:AlternateContent xmlns:mc="http://schemas.openxmlformats.org/markup-compatibility/2006">
+        <mc:Choice xmlns:a14="http://schemas.microsoft.com/office/drawing/2010/main" Requires="a14">
+          <p:sp>
+            <p:nvSpPr>
+              <p:cNvPr id="2" name="ZoneTexte 1"/>
+              <p:cNvSpPr txBox="1"/>
+              <p:nvPr/>
+            </p:nvSpPr>
+            <p:spPr>
+              <a:xfrm>
+                <a:off x="2267744" y="4941168"/>
+                <a:ext cx="4848828" cy="991682"/>
+              </a:xfrm>
+              <a:prstGeom prst="rect">
+                <a:avLst/>
+              </a:prstGeom>
+              <a:noFill/>
+            </p:spPr>
+            <p:txBody>
+              <a:bodyPr wrap="none" rtlCol="0">
+                <a:spAutoFit/>
+              </a:bodyPr>
+              <a:lstStyle/>
+              <a:p>
+                <a14:m>
+                  <m:oMathPara xmlns:m="http://schemas.openxmlformats.org/officeDocument/2006/math">
+                    <m:oMathParaPr>
+                      <m:jc m:val="centerGroup"/>
+                    </m:oMathParaPr>
+                    <m:oMath xmlns:m="http://schemas.openxmlformats.org/officeDocument/2006/math">
+                      <m:sSup>
+                        <m:sSupPr>
+                          <m:ctrlPr>
+                            <a:rPr lang="en-GB" b="0" i="1" smtClean="0">
+                              <a:latin typeface="Cambria Math"/>
+                            </a:rPr>
+                          </m:ctrlPr>
+                        </m:sSupPr>
+                        <m:e>
+                          <m:r>
+                            <a:rPr lang="en-GB" b="0" i="1" smtClean="0">
+                              <a:latin typeface="Cambria Math"/>
+                            </a:rPr>
+                            <m:t>𝑝</m:t>
+                          </m:r>
+                        </m:e>
+                        <m:sup>
+                          <m:r>
+                            <a:rPr lang="en-GB" b="0" i="1" smtClean="0">
+                              <a:latin typeface="Cambria Math"/>
+                            </a:rPr>
+                            <m:t>′</m:t>
+                          </m:r>
+                        </m:sup>
+                      </m:sSup>
+                      <m:r>
+                        <a:rPr lang="en-GB" b="0" i="1" smtClean="0">
+                          <a:latin typeface="Cambria Math"/>
+                        </a:rPr>
+                        <m:t>=</m:t>
+                      </m:r>
+                      <m:r>
+                        <a:rPr lang="en-GB" b="0" i="1" smtClean="0">
+                          <a:latin typeface="Cambria Math"/>
+                        </a:rPr>
+                        <m:t>𝑞</m:t>
+                      </m:r>
+                      <m:r>
+                        <a:rPr lang="en-GB" b="0" i="1" smtClean="0">
+                          <a:latin typeface="Cambria Math"/>
+                        </a:rPr>
+                        <m:t> </m:t>
+                      </m:r>
+                      <m:r>
+                        <a:rPr lang="en-GB" b="0" i="1" smtClean="0">
+                          <a:latin typeface="Cambria Math"/>
+                        </a:rPr>
+                        <m:t>𝑝</m:t>
+                      </m:r>
+                      <m:r>
+                        <a:rPr lang="en-GB" b="0" i="1" smtClean="0">
+                          <a:latin typeface="Cambria Math"/>
+                        </a:rPr>
+                        <m:t> </m:t>
+                      </m:r>
+                      <m:sSup>
+                        <m:sSupPr>
+                          <m:ctrlPr>
+                            <a:rPr lang="en-GB" b="0" i="1" smtClean="0">
+                              <a:latin typeface="Cambria Math"/>
+                            </a:rPr>
+                          </m:ctrlPr>
+                        </m:sSupPr>
+                        <m:e>
+                          <m:r>
+                            <a:rPr lang="en-GB" b="0" i="1" smtClean="0">
+                              <a:latin typeface="Cambria Math"/>
+                            </a:rPr>
+                            <m:t>𝑞</m:t>
+                          </m:r>
+                        </m:e>
+                        <m:sup>
+                          <m:r>
+                            <a:rPr lang="en-GB" b="0" i="1" smtClean="0">
+                              <a:latin typeface="Cambria Math"/>
+                            </a:rPr>
+                            <m:t>−1</m:t>
+                          </m:r>
+                        </m:sup>
+                      </m:sSup>
+                      <m:r>
+                        <a:rPr lang="en-GB" b="0" i="1" smtClean="0">
+                          <a:latin typeface="Cambria Math"/>
+                        </a:rPr>
+                        <m:t> </m:t>
+                      </m:r>
+                      <m:r>
+                        <a:rPr lang="en-GB" b="0" i="1" smtClean="0">
+                          <a:latin typeface="Cambria Math"/>
+                        </a:rPr>
+                        <m:t>𝑎𝑣𝑒𝑐</m:t>
+                      </m:r>
+                      <m:r>
+                        <a:rPr lang="en-GB" b="0" i="1" smtClean="0">
+                          <a:latin typeface="Cambria Math"/>
+                        </a:rPr>
+                        <m:t> </m:t>
+                      </m:r>
+                      <m:r>
+                        <a:rPr lang="en-GB" b="0" i="1" smtClean="0">
+                          <a:latin typeface="Cambria Math"/>
+                        </a:rPr>
+                        <m:t>𝑞</m:t>
+                      </m:r>
+                      <m:r>
+                        <a:rPr lang="en-GB" b="0" i="1" smtClean="0">
+                          <a:latin typeface="Cambria Math"/>
+                        </a:rPr>
+                        <m:t>=(</m:t>
+                      </m:r>
+                      <m:func>
+                        <m:funcPr>
+                          <m:ctrlPr>
+                            <a:rPr lang="en-GB" b="0" i="1" smtClean="0">
+                              <a:latin typeface="Cambria Math"/>
+                            </a:rPr>
+                          </m:ctrlPr>
+                        </m:funcPr>
+                        <m:fName>
+                          <m:r>
+                            <m:rPr>
+                              <m:sty m:val="p"/>
+                            </m:rPr>
+                            <a:rPr lang="en-GB" b="0" i="0" smtClean="0">
+                              <a:latin typeface="Cambria Math"/>
+                            </a:rPr>
+                            <m:t>cos</m:t>
+                          </m:r>
+                        </m:fName>
+                        <m:e>
+                          <m:d>
+                            <m:dPr>
+                              <m:ctrlPr>
+                                <a:rPr lang="en-GB" b="0" i="1" smtClean="0">
+                                  <a:latin typeface="Cambria Math"/>
+                                </a:rPr>
+                              </m:ctrlPr>
+                            </m:dPr>
+                            <m:e>
+                              <m:f>
+                                <m:fPr>
+                                  <m:ctrlPr>
+                                    <a:rPr lang="en-GB" b="0" i="1" smtClean="0">
+                                      <a:latin typeface="Cambria Math"/>
+                                    </a:rPr>
+                                  </m:ctrlPr>
+                                </m:fPr>
+                                <m:num>
+                                  <m:r>
+                                    <a:rPr lang="en-GB" b="0" i="1" smtClean="0">
+                                      <a:latin typeface="Cambria Math"/>
+                                    </a:rPr>
+                                    <m:t>1</m:t>
+                                  </m:r>
+                                </m:num>
+                                <m:den>
+                                  <m:r>
+                                    <a:rPr lang="en-GB" b="0" i="1" smtClean="0">
+                                      <a:latin typeface="Cambria Math"/>
+                                    </a:rPr>
+                                    <m:t>2</m:t>
+                                  </m:r>
+                                </m:den>
+                              </m:f>
+                              <m:r>
+                                <a:rPr lang="en-GB" b="0" i="1" smtClean="0">
+                                  <a:latin typeface="Cambria Math"/>
+                                  <a:ea typeface="Cambria Math"/>
+                                </a:rPr>
+                                <m:t>𝜃</m:t>
+                              </m:r>
+                            </m:e>
+                          </m:d>
+                        </m:e>
+                      </m:func>
+                      <m:r>
+                        <a:rPr lang="en-GB" b="0" i="1" smtClean="0">
+                          <a:latin typeface="Cambria Math"/>
+                          <a:ea typeface="Cambria Math"/>
+                        </a:rPr>
+                        <m:t>, </m:t>
+                      </m:r>
+                      <m:r>
+                        <a:rPr lang="en-GB" b="1" i="1" smtClean="0">
+                          <a:latin typeface="Cambria Math"/>
+                          <a:ea typeface="Cambria Math"/>
+                        </a:rPr>
+                        <m:t>𝒗</m:t>
+                      </m:r>
+                      <m:func>
+                        <m:funcPr>
+                          <m:ctrlPr>
+                            <a:rPr lang="en-GB" b="0" i="1" smtClean="0">
+                              <a:latin typeface="Cambria Math"/>
+                              <a:ea typeface="Cambria Math"/>
+                            </a:rPr>
+                          </m:ctrlPr>
+                        </m:funcPr>
+                        <m:fName>
+                          <m:r>
+                            <m:rPr>
+                              <m:sty m:val="p"/>
+                            </m:rPr>
+                            <a:rPr lang="en-GB" b="0" i="0" smtClean="0">
+                              <a:latin typeface="Cambria Math"/>
+                              <a:ea typeface="Cambria Math"/>
+                            </a:rPr>
+                            <m:t>sin</m:t>
+                          </m:r>
+                        </m:fName>
+                        <m:e>
+                          <m:d>
+                            <m:dPr>
+                              <m:ctrlPr>
+                                <a:rPr lang="en-GB" b="0" i="1" smtClean="0">
+                                  <a:latin typeface="Cambria Math"/>
+                                  <a:ea typeface="Cambria Math"/>
+                                </a:rPr>
+                              </m:ctrlPr>
+                            </m:dPr>
+                            <m:e>
+                              <m:f>
+                                <m:fPr>
+                                  <m:ctrlPr>
+                                    <a:rPr lang="en-GB" b="0" i="1" smtClean="0">
+                                      <a:latin typeface="Cambria Math"/>
+                                      <a:ea typeface="Cambria Math"/>
+                                    </a:rPr>
+                                  </m:ctrlPr>
+                                </m:fPr>
+                                <m:num>
+                                  <m:r>
+                                    <a:rPr lang="en-GB" b="0" i="1" smtClean="0">
+                                      <a:latin typeface="Cambria Math"/>
+                                      <a:ea typeface="Cambria Math"/>
+                                    </a:rPr>
+                                    <m:t>1</m:t>
+                                  </m:r>
+                                </m:num>
+                                <m:den>
+                                  <m:r>
+                                    <a:rPr lang="en-GB" b="0" i="1" smtClean="0">
+                                      <a:latin typeface="Cambria Math"/>
+                                      <a:ea typeface="Cambria Math"/>
+                                    </a:rPr>
+                                    <m:t>2</m:t>
+                                  </m:r>
+                                </m:den>
+                              </m:f>
+                              <m:r>
+                                <a:rPr lang="en-GB" b="0" i="1" smtClean="0">
+                                  <a:latin typeface="Cambria Math"/>
+                                  <a:ea typeface="Cambria Math"/>
+                                </a:rPr>
+                                <m:t>𝜃</m:t>
+                              </m:r>
+                            </m:e>
+                          </m:d>
+                        </m:e>
+                      </m:func>
+                      <m:r>
+                        <a:rPr lang="en-GB" b="0" i="1" smtClean="0">
+                          <a:latin typeface="Cambria Math"/>
+                          <a:ea typeface="Cambria Math"/>
+                        </a:rPr>
+                        <m:t>)</m:t>
+                      </m:r>
+                    </m:oMath>
+                  </m:oMathPara>
+                </a14:m>
+                <a:endParaRPr lang="en-GB" b="0" i="1" dirty="0" smtClean="0">
+                  <a:latin typeface="Cambria Math"/>
+                </a:endParaRPr>
+              </a:p>
+              <a:p>
+                <a:endParaRPr lang="en-GB" b="0" i="1" dirty="0" smtClean="0">
+                  <a:latin typeface="Cambria Math"/>
+                </a:endParaRPr>
+              </a:p>
+            </p:txBody>
+          </p:sp>
+        </mc:Choice>
+        <mc:Fallback>
+          <p:sp>
+            <p:nvSpPr>
+              <p:cNvPr id="2" name="ZoneTexte 1"/>
+              <p:cNvSpPr txBox="1">
+                <a:spLocks noRot="1" noChangeAspect="1" noMove="1" noResize="1" noEditPoints="1" noAdjustHandles="1" noChangeArrowheads="1" noChangeShapeType="1" noTextEdit="1"/>
+              </p:cNvSpPr>
+              <p:nvPr/>
+            </p:nvSpPr>
+            <p:spPr>
+              <a:xfrm>
+                <a:off x="2267744" y="4941168"/>
+                <a:ext cx="4848828" cy="991682"/>
+              </a:xfrm>
+              <a:prstGeom prst="rect">
+                <a:avLst/>
+              </a:prstGeom>
+              <a:blipFill rotWithShape="1">
+                <a:blip r:embed="rId2"/>
+                <a:stretch>
+                  <a:fillRect/>
+                </a:stretch>
+              </a:blipFill>
+            </p:spPr>
+            <p:txBody>
+              <a:bodyPr/>
+              <a:lstStyle/>
+              <a:p>
+                <a:r>
+                  <a:rPr lang="fr-CH">
+                    <a:noFill/>
+                  </a:rPr>
+                  <a:t> </a:t>
+                </a:r>
+              </a:p>
+            </p:txBody>
+          </p:sp>
+        </mc:Fallback>
+      </mc:AlternateContent>
     </p:spTree>
     <p:extLst>
       <p:ext uri="{BB962C8B-B14F-4D97-AF65-F5344CB8AC3E}">

</xml_diff>